<commit_message>
presentation update _survey responses
</commit_message>
<xml_diff>
--- a/Project SurWei.pptx
+++ b/Project SurWei.pptx
@@ -5,10 +5,10 @@
     <p:sldMasterId id="2147483684" r:id="rId4"/>
   </p:sldMasterIdLst>
   <p:notesMasterIdLst>
-    <p:notesMasterId r:id="rId13"/>
+    <p:notesMasterId r:id="rId14"/>
   </p:notesMasterIdLst>
   <p:handoutMasterIdLst>
-    <p:handoutMasterId r:id="rId14"/>
+    <p:handoutMasterId r:id="rId15"/>
   </p:handoutMasterIdLst>
   <p:sldIdLst>
     <p:sldId id="257" r:id="rId5"/>
@@ -17,8 +17,9 @@
     <p:sldId id="277" r:id="rId8"/>
     <p:sldId id="392" r:id="rId9"/>
     <p:sldId id="278" r:id="rId10"/>
-    <p:sldId id="393" r:id="rId11"/>
-    <p:sldId id="391" r:id="rId12"/>
+    <p:sldId id="394" r:id="rId11"/>
+    <p:sldId id="393" r:id="rId12"/>
+    <p:sldId id="391" r:id="rId13"/>
   </p:sldIdLst>
   <p:sldSz cx="12192000" cy="6858000"/>
   <p:notesSz cx="6858000" cy="9144000"/>
@@ -166,7 +167,7 @@
           <p:cNvPr id="2" name="Header Placeholder 1">
             <a:extLst>
               <a:ext uri="{FF2B5EF4-FFF2-40B4-BE49-F238E27FC236}">
-                <a16:creationId xmlns:a16="http://schemas.microsoft.com/office/drawing/2014/main" id="{D1471C2C-1567-47F4-803E-468024209D92}"/>
+                <a16:creationId xmlns:a16="http://schemas.microsoft.com/office/drawing/2014/main" xmlns="" id="{D1471C2C-1567-47F4-803E-468024209D92}"/>
               </a:ext>
             </a:extLst>
           </p:cNvPr>
@@ -203,7 +204,7 @@
           <p:cNvPr id="3" name="Date Placeholder 2">
             <a:extLst>
               <a:ext uri="{FF2B5EF4-FFF2-40B4-BE49-F238E27FC236}">
-                <a16:creationId xmlns:a16="http://schemas.microsoft.com/office/drawing/2014/main" id="{058F5B09-2954-46C6-97BB-9E10649FE2C3}"/>
+                <a16:creationId xmlns:a16="http://schemas.microsoft.com/office/drawing/2014/main" xmlns="" id="{058F5B09-2954-46C6-97BB-9E10649FE2C3}"/>
               </a:ext>
             </a:extLst>
           </p:cNvPr>
@@ -244,7 +245,7 @@
           <p:cNvPr id="4" name="Footer Placeholder 3">
             <a:extLst>
               <a:ext uri="{FF2B5EF4-FFF2-40B4-BE49-F238E27FC236}">
-                <a16:creationId xmlns:a16="http://schemas.microsoft.com/office/drawing/2014/main" id="{E39A204B-EBA9-4C6D-BFB2-A104F00C8E26}"/>
+                <a16:creationId xmlns:a16="http://schemas.microsoft.com/office/drawing/2014/main" xmlns="" id="{E39A204B-EBA9-4C6D-BFB2-A104F00C8E26}"/>
               </a:ext>
             </a:extLst>
           </p:cNvPr>
@@ -281,7 +282,7 @@
           <p:cNvPr id="5" name="Slide Number Placeholder 4">
             <a:extLst>
               <a:ext uri="{FF2B5EF4-FFF2-40B4-BE49-F238E27FC236}">
-                <a16:creationId xmlns:a16="http://schemas.microsoft.com/office/drawing/2014/main" id="{855F72FC-4D2D-4E5B-A4DD-62E2C822FB1E}"/>
+                <a16:creationId xmlns:a16="http://schemas.microsoft.com/office/drawing/2014/main" xmlns="" id="{855F72FC-4D2D-4E5B-A4DD-62E2C822FB1E}"/>
               </a:ext>
             </a:extLst>
           </p:cNvPr>
@@ -867,7 +868,7 @@
           <p:cNvPr id="6" name="Title 1">
             <a:extLst>
               <a:ext uri="{FF2B5EF4-FFF2-40B4-BE49-F238E27FC236}">
-                <a16:creationId xmlns:a16="http://schemas.microsoft.com/office/drawing/2014/main" id="{9E68F591-F3C7-4872-BBA0-0693794F4F11}"/>
+                <a16:creationId xmlns:a16="http://schemas.microsoft.com/office/drawing/2014/main" xmlns="" id="{9E68F591-F3C7-4872-BBA0-0693794F4F11}"/>
               </a:ext>
             </a:extLst>
           </p:cNvPr>
@@ -902,7 +903,7 @@
           <p:cNvPr id="14" name="Picture Placeholder 13">
             <a:extLst>
               <a:ext uri="{FF2B5EF4-FFF2-40B4-BE49-F238E27FC236}">
-                <a16:creationId xmlns:a16="http://schemas.microsoft.com/office/drawing/2014/main" id="{967766A8-18D5-4391-8DB7-7BFF6427636C}"/>
+                <a16:creationId xmlns:a16="http://schemas.microsoft.com/office/drawing/2014/main" xmlns="" id="{967766A8-18D5-4391-8DB7-7BFF6427636C}"/>
               </a:ext>
             </a:extLst>
           </p:cNvPr>
@@ -940,10 +941,10 @@
           <p:cNvPr id="8" name="Oval 7">
             <a:extLst>
               <a:ext uri="{FF2B5EF4-FFF2-40B4-BE49-F238E27FC236}">
-                <a16:creationId xmlns:a16="http://schemas.microsoft.com/office/drawing/2014/main" id="{938AD48E-7D67-4BE9-97B6-DB64DE5253B9}"/>
+                <a16:creationId xmlns:a16="http://schemas.microsoft.com/office/drawing/2014/main" xmlns="" id="{938AD48E-7D67-4BE9-97B6-DB64DE5253B9}"/>
               </a:ext>
               <a:ext uri="{C183D7F6-B498-43B3-948B-1728B52AA6E4}">
-                <adec:decorative xmlns:adec="http://schemas.microsoft.com/office/drawing/2017/decorative" val="1"/>
+                <adec:decorative xmlns:adec="http://schemas.microsoft.com/office/drawing/2017/decorative" xmlns="" val="1"/>
               </a:ext>
             </a:extLst>
           </p:cNvPr>
@@ -1026,10 +1027,10 @@
           <p:cNvPr id="9" name="Group 8">
             <a:extLst>
               <a:ext uri="{FF2B5EF4-FFF2-40B4-BE49-F238E27FC236}">
-                <a16:creationId xmlns:a16="http://schemas.microsoft.com/office/drawing/2014/main" id="{EB6FF8E2-165B-49EB-8120-14190F9491BC}"/>
+                <a16:creationId xmlns:a16="http://schemas.microsoft.com/office/drawing/2014/main" xmlns="" id="{EB6FF8E2-165B-49EB-8120-14190F9491BC}"/>
               </a:ext>
               <a:ext uri="{C183D7F6-B498-43B3-948B-1728B52AA6E4}">
-                <adec:decorative xmlns:adec="http://schemas.microsoft.com/office/drawing/2017/decorative" val="1"/>
+                <adec:decorative xmlns:adec="http://schemas.microsoft.com/office/drawing/2017/decorative" xmlns="" val="1"/>
               </a:ext>
             </a:extLst>
           </p:cNvPr>
@@ -1049,7 +1050,7 @@
             <p:cNvPr id="10" name="Freeform: Shape 9">
               <a:extLst>
                 <a:ext uri="{FF2B5EF4-FFF2-40B4-BE49-F238E27FC236}">
-                  <a16:creationId xmlns:a16="http://schemas.microsoft.com/office/drawing/2014/main" id="{79B763A7-EE7D-4306-8306-01E8C86E6350}"/>
+                  <a16:creationId xmlns:a16="http://schemas.microsoft.com/office/drawing/2014/main" xmlns="" id="{79B763A7-EE7D-4306-8306-01E8C86E6350}"/>
                 </a:ext>
               </a:extLst>
             </p:cNvPr>
@@ -1271,7 +1272,7 @@
             <p:cNvPr id="11" name="Oval 10">
               <a:extLst>
                 <a:ext uri="{FF2B5EF4-FFF2-40B4-BE49-F238E27FC236}">
-                  <a16:creationId xmlns:a16="http://schemas.microsoft.com/office/drawing/2014/main" id="{4B3A935F-6844-4FCE-B0AE-5492715A58F1}"/>
+                  <a16:creationId xmlns:a16="http://schemas.microsoft.com/office/drawing/2014/main" xmlns="" id="{4B3A935F-6844-4FCE-B0AE-5492715A58F1}"/>
                 </a:ext>
               </a:extLst>
             </p:cNvPr>
@@ -1341,7 +1342,7 @@
           <p:cNvPr id="3" name="Text Placeholder 2">
             <a:extLst>
               <a:ext uri="{FF2B5EF4-FFF2-40B4-BE49-F238E27FC236}">
-                <a16:creationId xmlns:a16="http://schemas.microsoft.com/office/drawing/2014/main" id="{5B16EB97-6E8A-4B50-8701-7CB158044DCA}"/>
+                <a16:creationId xmlns:a16="http://schemas.microsoft.com/office/drawing/2014/main" xmlns="" id="{5B16EB97-6E8A-4B50-8701-7CB158044DCA}"/>
               </a:ext>
             </a:extLst>
           </p:cNvPr>
@@ -1428,10 +1429,10 @@
           <p:cNvPr id="34" name="Group 33">
             <a:extLst>
               <a:ext uri="{FF2B5EF4-FFF2-40B4-BE49-F238E27FC236}">
-                <a16:creationId xmlns:a16="http://schemas.microsoft.com/office/drawing/2014/main" id="{79DE9FAB-6BBA-4CFE-B67D-77B47F01ECA4}"/>
+                <a16:creationId xmlns:a16="http://schemas.microsoft.com/office/drawing/2014/main" xmlns="" id="{79DE9FAB-6BBA-4CFE-B67D-77B47F01ECA4}"/>
               </a:ext>
               <a:ext uri="{C183D7F6-B498-43B3-948B-1728B52AA6E4}">
-                <adec:decorative xmlns:adec="http://schemas.microsoft.com/office/drawing/2017/decorative" val="1"/>
+                <adec:decorative xmlns:adec="http://schemas.microsoft.com/office/drawing/2017/decorative" xmlns="" val="1"/>
               </a:ext>
             </a:extLst>
           </p:cNvPr>
@@ -1451,7 +1452,7 @@
             <p:cNvPr id="35" name="Freeform: Shape 34">
               <a:extLst>
                 <a:ext uri="{FF2B5EF4-FFF2-40B4-BE49-F238E27FC236}">
-                  <a16:creationId xmlns:a16="http://schemas.microsoft.com/office/drawing/2014/main" id="{79FAC916-D9BB-4794-81B4-7C47C67E850D}"/>
+                  <a16:creationId xmlns:a16="http://schemas.microsoft.com/office/drawing/2014/main" xmlns="" id="{79FAC916-D9BB-4794-81B4-7C47C67E850D}"/>
                 </a:ext>
               </a:extLst>
             </p:cNvPr>
@@ -1591,7 +1592,7 @@
             <p:cNvPr id="36" name="Freeform: Shape 35">
               <a:extLst>
                 <a:ext uri="{FF2B5EF4-FFF2-40B4-BE49-F238E27FC236}">
-                  <a16:creationId xmlns:a16="http://schemas.microsoft.com/office/drawing/2014/main" id="{B5CA2231-7A65-4D16-8400-A210CC41DB73}"/>
+                  <a16:creationId xmlns:a16="http://schemas.microsoft.com/office/drawing/2014/main" xmlns="" id="{B5CA2231-7A65-4D16-8400-A210CC41DB73}"/>
                 </a:ext>
               </a:extLst>
             </p:cNvPr>
@@ -1733,7 +1734,7 @@
             <p:cNvPr id="37" name="Oval 36">
               <a:extLst>
                 <a:ext uri="{FF2B5EF4-FFF2-40B4-BE49-F238E27FC236}">
-                  <a16:creationId xmlns:a16="http://schemas.microsoft.com/office/drawing/2014/main" id="{4B089C8C-B82B-4704-88E2-E857A5E21529}"/>
+                  <a16:creationId xmlns:a16="http://schemas.microsoft.com/office/drawing/2014/main" xmlns="" id="{4B089C8C-B82B-4704-88E2-E857A5E21529}"/>
                 </a:ext>
               </a:extLst>
             </p:cNvPr>
@@ -1802,7 +1803,7 @@
             <p:cNvPr id="38" name="Oval 37">
               <a:extLst>
                 <a:ext uri="{FF2B5EF4-FFF2-40B4-BE49-F238E27FC236}">
-                  <a16:creationId xmlns:a16="http://schemas.microsoft.com/office/drawing/2014/main" id="{434B90C8-5B4D-456E-AD99-80EF748FDD72}"/>
+                  <a16:creationId xmlns:a16="http://schemas.microsoft.com/office/drawing/2014/main" xmlns="" id="{434B90C8-5B4D-456E-AD99-80EF748FDD72}"/>
                 </a:ext>
               </a:extLst>
             </p:cNvPr>
@@ -1872,10 +1873,10 @@
           <p:cNvPr id="19" name="Freeform: Shape 18">
             <a:extLst>
               <a:ext uri="{FF2B5EF4-FFF2-40B4-BE49-F238E27FC236}">
-                <a16:creationId xmlns:a16="http://schemas.microsoft.com/office/drawing/2014/main" id="{82184FF4-7029-4ED7-813A-192E60608764}"/>
+                <a16:creationId xmlns:a16="http://schemas.microsoft.com/office/drawing/2014/main" xmlns="" id="{82184FF4-7029-4ED7-813A-192E60608764}"/>
               </a:ext>
               <a:ext uri="{C183D7F6-B498-43B3-948B-1728B52AA6E4}">
-                <adec:decorative xmlns:adec="http://schemas.microsoft.com/office/drawing/2017/decorative" val="1"/>
+                <adec:decorative xmlns:adec="http://schemas.microsoft.com/office/drawing/2017/decorative" xmlns="" val="1"/>
               </a:ext>
             </a:extLst>
           </p:cNvPr>
@@ -2097,10 +2098,10 @@
           <p:cNvPr id="20" name="Oval 19">
             <a:extLst>
               <a:ext uri="{FF2B5EF4-FFF2-40B4-BE49-F238E27FC236}">
-                <a16:creationId xmlns:a16="http://schemas.microsoft.com/office/drawing/2014/main" id="{AAA7AB09-557C-41AD-9113-FF9F68FA1035}"/>
+                <a16:creationId xmlns:a16="http://schemas.microsoft.com/office/drawing/2014/main" xmlns="" id="{AAA7AB09-557C-41AD-9113-FF9F68FA1035}"/>
               </a:ext>
               <a:ext uri="{C183D7F6-B498-43B3-948B-1728B52AA6E4}">
-                <adec:decorative xmlns:adec="http://schemas.microsoft.com/office/drawing/2017/decorative" val="1"/>
+                <adec:decorative xmlns:adec="http://schemas.microsoft.com/office/drawing/2017/decorative" xmlns="" val="1"/>
               </a:ext>
             </a:extLst>
           </p:cNvPr>
@@ -2180,10 +2181,10 @@
           <p:cNvPr id="25" name="Oval 24">
             <a:extLst>
               <a:ext uri="{FF2B5EF4-FFF2-40B4-BE49-F238E27FC236}">
-                <a16:creationId xmlns:a16="http://schemas.microsoft.com/office/drawing/2014/main" id="{EF99ECAA-1F11-4937-BBA6-51935AB44C9D}"/>
+                <a16:creationId xmlns:a16="http://schemas.microsoft.com/office/drawing/2014/main" xmlns="" id="{EF99ECAA-1F11-4937-BBA6-51935AB44C9D}"/>
               </a:ext>
               <a:ext uri="{C183D7F6-B498-43B3-948B-1728B52AA6E4}">
-                <adec:decorative xmlns:adec="http://schemas.microsoft.com/office/drawing/2017/decorative" val="1"/>
+                <adec:decorative xmlns:adec="http://schemas.microsoft.com/office/drawing/2017/decorative" xmlns="" val="1"/>
               </a:ext>
             </a:extLst>
           </p:cNvPr>
@@ -2266,7 +2267,7 @@
           <p:cNvPr id="15" name="Title 1">
             <a:extLst>
               <a:ext uri="{FF2B5EF4-FFF2-40B4-BE49-F238E27FC236}">
-                <a16:creationId xmlns:a16="http://schemas.microsoft.com/office/drawing/2014/main" id="{EBCCE83C-72C8-4181-8D03-7CFB23A6FF2D}"/>
+                <a16:creationId xmlns:a16="http://schemas.microsoft.com/office/drawing/2014/main" xmlns="" id="{EBCCE83C-72C8-4181-8D03-7CFB23A6FF2D}"/>
               </a:ext>
             </a:extLst>
           </p:cNvPr>
@@ -2311,7 +2312,7 @@
           <p:cNvPr id="16" name="Text Placeholder 2">
             <a:extLst>
               <a:ext uri="{FF2B5EF4-FFF2-40B4-BE49-F238E27FC236}">
-                <a16:creationId xmlns:a16="http://schemas.microsoft.com/office/drawing/2014/main" id="{C6FCDFCC-38D1-43A4-918F-491DBA6B2CF6}"/>
+                <a16:creationId xmlns:a16="http://schemas.microsoft.com/office/drawing/2014/main" xmlns="" id="{C6FCDFCC-38D1-43A4-918F-491DBA6B2CF6}"/>
               </a:ext>
             </a:extLst>
           </p:cNvPr>
@@ -2389,7 +2390,7 @@
           <p:cNvPr id="17" name="Content Placeholder 3">
             <a:extLst>
               <a:ext uri="{FF2B5EF4-FFF2-40B4-BE49-F238E27FC236}">
-                <a16:creationId xmlns:a16="http://schemas.microsoft.com/office/drawing/2014/main" id="{8A9CB740-8581-4D62-8481-7ECBBEDA7219}"/>
+                <a16:creationId xmlns:a16="http://schemas.microsoft.com/office/drawing/2014/main" xmlns="" id="{8A9CB740-8581-4D62-8481-7ECBBEDA7219}"/>
               </a:ext>
             </a:extLst>
           </p:cNvPr>
@@ -2470,7 +2471,7 @@
           <p:cNvPr id="22" name="Text Placeholder 4">
             <a:extLst>
               <a:ext uri="{FF2B5EF4-FFF2-40B4-BE49-F238E27FC236}">
-                <a16:creationId xmlns:a16="http://schemas.microsoft.com/office/drawing/2014/main" id="{AB16E493-D962-46EC-BBB8-D7E68A640438}"/>
+                <a16:creationId xmlns:a16="http://schemas.microsoft.com/office/drawing/2014/main" xmlns="" id="{AB16E493-D962-46EC-BBB8-D7E68A640438}"/>
               </a:ext>
             </a:extLst>
           </p:cNvPr>
@@ -2515,7 +2516,7 @@
           <p:cNvPr id="23" name="Content Placeholder 5">
             <a:extLst>
               <a:ext uri="{FF2B5EF4-FFF2-40B4-BE49-F238E27FC236}">
-                <a16:creationId xmlns:a16="http://schemas.microsoft.com/office/drawing/2014/main" id="{88CC7C67-1BA6-42A6-B9D3-8EDF70A3DB38}"/>
+                <a16:creationId xmlns:a16="http://schemas.microsoft.com/office/drawing/2014/main" xmlns="" id="{88CC7C67-1BA6-42A6-B9D3-8EDF70A3DB38}"/>
               </a:ext>
             </a:extLst>
           </p:cNvPr>
@@ -2596,7 +2597,7 @@
           <p:cNvPr id="18" name="Text Placeholder 4">
             <a:extLst>
               <a:ext uri="{FF2B5EF4-FFF2-40B4-BE49-F238E27FC236}">
-                <a16:creationId xmlns:a16="http://schemas.microsoft.com/office/drawing/2014/main" id="{C17092A6-D0E6-4EF2-B3B8-AE35438D4D77}"/>
+                <a16:creationId xmlns:a16="http://schemas.microsoft.com/office/drawing/2014/main" xmlns="" id="{C17092A6-D0E6-4EF2-B3B8-AE35438D4D77}"/>
               </a:ext>
             </a:extLst>
           </p:cNvPr>
@@ -2641,7 +2642,7 @@
           <p:cNvPr id="21" name="Content Placeholder 5">
             <a:extLst>
               <a:ext uri="{FF2B5EF4-FFF2-40B4-BE49-F238E27FC236}">
-                <a16:creationId xmlns:a16="http://schemas.microsoft.com/office/drawing/2014/main" id="{4534254A-2561-400F-87CB-18A8D3538124}"/>
+                <a16:creationId xmlns:a16="http://schemas.microsoft.com/office/drawing/2014/main" xmlns="" id="{4534254A-2561-400F-87CB-18A8D3538124}"/>
               </a:ext>
             </a:extLst>
           </p:cNvPr>
@@ -2722,7 +2723,7 @@
           <p:cNvPr id="4" name="Date Placeholder 3">
             <a:extLst>
               <a:ext uri="{FF2B5EF4-FFF2-40B4-BE49-F238E27FC236}">
-                <a16:creationId xmlns:a16="http://schemas.microsoft.com/office/drawing/2014/main" id="{8B1BC074-1090-47AF-BDE8-3859BF574BA6}"/>
+                <a16:creationId xmlns:a16="http://schemas.microsoft.com/office/drawing/2014/main" xmlns="" id="{8B1BC074-1090-47AF-BDE8-3859BF574BA6}"/>
               </a:ext>
             </a:extLst>
           </p:cNvPr>
@@ -2753,7 +2754,7 @@
           <p:cNvPr id="5" name="Footer Placeholder 4">
             <a:extLst>
               <a:ext uri="{FF2B5EF4-FFF2-40B4-BE49-F238E27FC236}">
-                <a16:creationId xmlns:a16="http://schemas.microsoft.com/office/drawing/2014/main" id="{F1D6522F-D41A-4734-8BD1-BD6E5A37D04C}"/>
+                <a16:creationId xmlns:a16="http://schemas.microsoft.com/office/drawing/2014/main" xmlns="" id="{F1D6522F-D41A-4734-8BD1-BD6E5A37D04C}"/>
               </a:ext>
             </a:extLst>
           </p:cNvPr>
@@ -2783,7 +2784,7 @@
           <p:cNvPr id="6" name="Slide Number Placeholder 5">
             <a:extLst>
               <a:ext uri="{FF2B5EF4-FFF2-40B4-BE49-F238E27FC236}">
-                <a16:creationId xmlns:a16="http://schemas.microsoft.com/office/drawing/2014/main" id="{D74D4206-406C-42A3-BBD4-44C043180931}"/>
+                <a16:creationId xmlns:a16="http://schemas.microsoft.com/office/drawing/2014/main" xmlns="" id="{D74D4206-406C-42A3-BBD4-44C043180931}"/>
               </a:ext>
             </a:extLst>
           </p:cNvPr>
@@ -2844,7 +2845,7 @@
           <p:cNvPr id="5" name="Title 1">
             <a:extLst>
               <a:ext uri="{FF2B5EF4-FFF2-40B4-BE49-F238E27FC236}">
-                <a16:creationId xmlns:a16="http://schemas.microsoft.com/office/drawing/2014/main" id="{E949202B-67AE-417A-A336-DF5257FFDCF0}"/>
+                <a16:creationId xmlns:a16="http://schemas.microsoft.com/office/drawing/2014/main" xmlns="" id="{E949202B-67AE-417A-A336-DF5257FFDCF0}"/>
               </a:ext>
             </a:extLst>
           </p:cNvPr>
@@ -2879,7 +2880,7 @@
           <p:cNvPr id="10" name="Picture Placeholder 9">
             <a:extLst>
               <a:ext uri="{FF2B5EF4-FFF2-40B4-BE49-F238E27FC236}">
-                <a16:creationId xmlns:a16="http://schemas.microsoft.com/office/drawing/2014/main" id="{1786D546-2834-435F-950F-DCEFE654B3B1}"/>
+                <a16:creationId xmlns:a16="http://schemas.microsoft.com/office/drawing/2014/main" xmlns="" id="{1786D546-2834-435F-950F-DCEFE654B3B1}"/>
               </a:ext>
             </a:extLst>
           </p:cNvPr>
@@ -2917,7 +2918,7 @@
           <p:cNvPr id="7" name="Content Placeholder 6">
             <a:extLst>
               <a:ext uri="{FF2B5EF4-FFF2-40B4-BE49-F238E27FC236}">
-                <a16:creationId xmlns:a16="http://schemas.microsoft.com/office/drawing/2014/main" id="{3BD763BD-EAC5-4DB8-81AF-9743BB6A9576}"/>
+                <a16:creationId xmlns:a16="http://schemas.microsoft.com/office/drawing/2014/main" xmlns="" id="{3BD763BD-EAC5-4DB8-81AF-9743BB6A9576}"/>
               </a:ext>
             </a:extLst>
           </p:cNvPr>
@@ -2974,7 +2975,7 @@
           <p:cNvPr id="2" name="Date Placeholder 1">
             <a:extLst>
               <a:ext uri="{FF2B5EF4-FFF2-40B4-BE49-F238E27FC236}">
-                <a16:creationId xmlns:a16="http://schemas.microsoft.com/office/drawing/2014/main" id="{AB81B449-7B97-41DC-B23F-65EDCBD316A6}"/>
+                <a16:creationId xmlns:a16="http://schemas.microsoft.com/office/drawing/2014/main" xmlns="" id="{AB81B449-7B97-41DC-B23F-65EDCBD316A6}"/>
               </a:ext>
             </a:extLst>
           </p:cNvPr>
@@ -3004,7 +3005,7 @@
           <p:cNvPr id="3" name="Footer Placeholder 2">
             <a:extLst>
               <a:ext uri="{FF2B5EF4-FFF2-40B4-BE49-F238E27FC236}">
-                <a16:creationId xmlns:a16="http://schemas.microsoft.com/office/drawing/2014/main" id="{7C6B46D5-337B-4906-8412-4EEA3884FA7E}"/>
+                <a16:creationId xmlns:a16="http://schemas.microsoft.com/office/drawing/2014/main" xmlns="" id="{7C6B46D5-337B-4906-8412-4EEA3884FA7E}"/>
               </a:ext>
             </a:extLst>
           </p:cNvPr>
@@ -3034,7 +3035,7 @@
           <p:cNvPr id="4" name="Slide Number Placeholder 3">
             <a:extLst>
               <a:ext uri="{FF2B5EF4-FFF2-40B4-BE49-F238E27FC236}">
-                <a16:creationId xmlns:a16="http://schemas.microsoft.com/office/drawing/2014/main" id="{E436F230-C9A7-407A-B923-873839C8D8A0}"/>
+                <a16:creationId xmlns:a16="http://schemas.microsoft.com/office/drawing/2014/main" xmlns="" id="{E436F230-C9A7-407A-B923-873839C8D8A0}"/>
               </a:ext>
             </a:extLst>
           </p:cNvPr>
@@ -3065,10 +3066,10 @@
           <p:cNvPr id="8" name="Oval 7">
             <a:extLst>
               <a:ext uri="{FF2B5EF4-FFF2-40B4-BE49-F238E27FC236}">
-                <a16:creationId xmlns:a16="http://schemas.microsoft.com/office/drawing/2014/main" id="{446AF837-10C6-44A5-B8D6-960A57487B43}"/>
+                <a16:creationId xmlns:a16="http://schemas.microsoft.com/office/drawing/2014/main" xmlns="" id="{446AF837-10C6-44A5-B8D6-960A57487B43}"/>
               </a:ext>
               <a:ext uri="{C183D7F6-B498-43B3-948B-1728B52AA6E4}">
-                <adec:decorative xmlns:adec="http://schemas.microsoft.com/office/drawing/2017/decorative" val="1"/>
+                <adec:decorative xmlns:adec="http://schemas.microsoft.com/office/drawing/2017/decorative" xmlns="" val="1"/>
               </a:ext>
             </a:extLst>
           </p:cNvPr>
@@ -3181,7 +3182,7 @@
           <p:cNvPr id="28" name="Title 1">
             <a:extLst>
               <a:ext uri="{FF2B5EF4-FFF2-40B4-BE49-F238E27FC236}">
-                <a16:creationId xmlns:a16="http://schemas.microsoft.com/office/drawing/2014/main" id="{97246E34-E6EE-4BF3-A0D3-A20868B5A594}"/>
+                <a16:creationId xmlns:a16="http://schemas.microsoft.com/office/drawing/2014/main" xmlns="" id="{97246E34-E6EE-4BF3-A0D3-A20868B5A594}"/>
               </a:ext>
             </a:extLst>
           </p:cNvPr>
@@ -3217,7 +3218,7 @@
           <p:cNvPr id="31" name="Subtitle 2">
             <a:extLst>
               <a:ext uri="{FF2B5EF4-FFF2-40B4-BE49-F238E27FC236}">
-                <a16:creationId xmlns:a16="http://schemas.microsoft.com/office/drawing/2014/main" id="{45BE5FFB-47D1-4474-B6CA-C3C936DF285E}"/>
+                <a16:creationId xmlns:a16="http://schemas.microsoft.com/office/drawing/2014/main" xmlns="" id="{45BE5FFB-47D1-4474-B6CA-C3C936DF285E}"/>
               </a:ext>
             </a:extLst>
           </p:cNvPr>
@@ -3270,7 +3271,7 @@
           <p:cNvPr id="40" name="Picture Placeholder 39">
             <a:extLst>
               <a:ext uri="{FF2B5EF4-FFF2-40B4-BE49-F238E27FC236}">
-                <a16:creationId xmlns:a16="http://schemas.microsoft.com/office/drawing/2014/main" id="{008D9209-1A62-4AC3-BF92-94348A9BC06B}"/>
+                <a16:creationId xmlns:a16="http://schemas.microsoft.com/office/drawing/2014/main" xmlns="" id="{008D9209-1A62-4AC3-BF92-94348A9BC06B}"/>
               </a:ext>
             </a:extLst>
           </p:cNvPr>
@@ -3309,7 +3310,7 @@
           <p:cNvPr id="42" name="Picture Placeholder 41">
             <a:extLst>
               <a:ext uri="{FF2B5EF4-FFF2-40B4-BE49-F238E27FC236}">
-                <a16:creationId xmlns:a16="http://schemas.microsoft.com/office/drawing/2014/main" id="{FADBFB6B-1787-4549-91B6-D748C66B13C6}"/>
+                <a16:creationId xmlns:a16="http://schemas.microsoft.com/office/drawing/2014/main" xmlns="" id="{FADBFB6B-1787-4549-91B6-D748C66B13C6}"/>
               </a:ext>
             </a:extLst>
           </p:cNvPr>
@@ -3347,10 +3348,10 @@
           <p:cNvPr id="43" name="Group 42">
             <a:extLst>
               <a:ext uri="{FF2B5EF4-FFF2-40B4-BE49-F238E27FC236}">
-                <a16:creationId xmlns:a16="http://schemas.microsoft.com/office/drawing/2014/main" id="{06966E3E-9B30-4375-AC9A-23256CC87D25}"/>
+                <a16:creationId xmlns:a16="http://schemas.microsoft.com/office/drawing/2014/main" xmlns="" id="{06966E3E-9B30-4375-AC9A-23256CC87D25}"/>
               </a:ext>
               <a:ext uri="{C183D7F6-B498-43B3-948B-1728B52AA6E4}">
-                <adec:decorative xmlns:adec="http://schemas.microsoft.com/office/drawing/2017/decorative" val="1"/>
+                <adec:decorative xmlns:adec="http://schemas.microsoft.com/office/drawing/2017/decorative" xmlns="" val="1"/>
               </a:ext>
             </a:extLst>
           </p:cNvPr>
@@ -3370,7 +3371,7 @@
             <p:cNvPr id="44" name="Freeform: Shape 43">
               <a:extLst>
                 <a:ext uri="{FF2B5EF4-FFF2-40B4-BE49-F238E27FC236}">
-                  <a16:creationId xmlns:a16="http://schemas.microsoft.com/office/drawing/2014/main" id="{4EBBC5A2-A37E-47DF-9230-9A75067F1883}"/>
+                  <a16:creationId xmlns:a16="http://schemas.microsoft.com/office/drawing/2014/main" xmlns="" id="{4EBBC5A2-A37E-47DF-9230-9A75067F1883}"/>
                 </a:ext>
               </a:extLst>
             </p:cNvPr>
@@ -3530,7 +3531,7 @@
             <p:cNvPr id="45" name="Oval 44">
               <a:extLst>
                 <a:ext uri="{FF2B5EF4-FFF2-40B4-BE49-F238E27FC236}">
-                  <a16:creationId xmlns:a16="http://schemas.microsoft.com/office/drawing/2014/main" id="{11781B9A-C230-4FFC-90A8-E0571B1DEDA7}"/>
+                  <a16:creationId xmlns:a16="http://schemas.microsoft.com/office/drawing/2014/main" xmlns="" id="{11781B9A-C230-4FFC-90A8-E0571B1DEDA7}"/>
                 </a:ext>
               </a:extLst>
             </p:cNvPr>
@@ -3596,7 +3597,7 @@
             <p:cNvPr id="46" name="Freeform: Shape 45">
               <a:extLst>
                 <a:ext uri="{FF2B5EF4-FFF2-40B4-BE49-F238E27FC236}">
-                  <a16:creationId xmlns:a16="http://schemas.microsoft.com/office/drawing/2014/main" id="{3295925C-3570-40F1-B3CE-07D947ED4643}"/>
+                  <a16:creationId xmlns:a16="http://schemas.microsoft.com/office/drawing/2014/main" xmlns="" id="{3295925C-3570-40F1-B3CE-07D947ED4643}"/>
                 </a:ext>
               </a:extLst>
             </p:cNvPr>
@@ -3755,10 +3756,10 @@
           <p:cNvPr id="15" name="Group 14">
             <a:extLst>
               <a:ext uri="{FF2B5EF4-FFF2-40B4-BE49-F238E27FC236}">
-                <a16:creationId xmlns:a16="http://schemas.microsoft.com/office/drawing/2014/main" id="{394664AE-6DC5-428F-9AC4-5A8F67571F72}"/>
+                <a16:creationId xmlns:a16="http://schemas.microsoft.com/office/drawing/2014/main" xmlns="" id="{394664AE-6DC5-428F-9AC4-5A8F67571F72}"/>
               </a:ext>
               <a:ext uri="{C183D7F6-B498-43B3-948B-1728B52AA6E4}">
-                <adec:decorative xmlns:adec="http://schemas.microsoft.com/office/drawing/2017/decorative" val="1"/>
+                <adec:decorative xmlns:adec="http://schemas.microsoft.com/office/drawing/2017/decorative" xmlns="" val="1"/>
               </a:ext>
             </a:extLst>
           </p:cNvPr>
@@ -3778,7 +3779,7 @@
             <p:cNvPr id="16" name="Freeform: Shape 15">
               <a:extLst>
                 <a:ext uri="{FF2B5EF4-FFF2-40B4-BE49-F238E27FC236}">
-                  <a16:creationId xmlns:a16="http://schemas.microsoft.com/office/drawing/2014/main" id="{8288F304-7DF7-42FB-BD6F-D575128A1DDE}"/>
+                  <a16:creationId xmlns:a16="http://schemas.microsoft.com/office/drawing/2014/main" xmlns="" id="{8288F304-7DF7-42FB-BD6F-D575128A1DDE}"/>
                 </a:ext>
               </a:extLst>
             </p:cNvPr>
@@ -4000,7 +4001,7 @@
             <p:cNvPr id="21" name="Oval 20">
               <a:extLst>
                 <a:ext uri="{FF2B5EF4-FFF2-40B4-BE49-F238E27FC236}">
-                  <a16:creationId xmlns:a16="http://schemas.microsoft.com/office/drawing/2014/main" id="{104835D9-7DE9-4DDD-A6C2-1C526822700A}"/>
+                  <a16:creationId xmlns:a16="http://schemas.microsoft.com/office/drawing/2014/main" xmlns="" id="{104835D9-7DE9-4DDD-A6C2-1C526822700A}"/>
                 </a:ext>
               </a:extLst>
             </p:cNvPr>
@@ -4070,7 +4071,7 @@
           <p:cNvPr id="5" name="Date Placeholder 4">
             <a:extLst>
               <a:ext uri="{FF2B5EF4-FFF2-40B4-BE49-F238E27FC236}">
-                <a16:creationId xmlns:a16="http://schemas.microsoft.com/office/drawing/2014/main" id="{E57D2D6F-49E8-4217-A908-2D9E43583589}"/>
+                <a16:creationId xmlns:a16="http://schemas.microsoft.com/office/drawing/2014/main" xmlns="" id="{E57D2D6F-49E8-4217-A908-2D9E43583589}"/>
               </a:ext>
             </a:extLst>
           </p:cNvPr>
@@ -4100,7 +4101,7 @@
           <p:cNvPr id="6" name="Footer Placeholder 5">
             <a:extLst>
               <a:ext uri="{FF2B5EF4-FFF2-40B4-BE49-F238E27FC236}">
-                <a16:creationId xmlns:a16="http://schemas.microsoft.com/office/drawing/2014/main" id="{591C4440-6B8D-4A24-A807-8B1302A3DFAF}"/>
+                <a16:creationId xmlns:a16="http://schemas.microsoft.com/office/drawing/2014/main" xmlns="" id="{591C4440-6B8D-4A24-A807-8B1302A3DFAF}"/>
               </a:ext>
             </a:extLst>
           </p:cNvPr>
@@ -4130,7 +4131,7 @@
           <p:cNvPr id="7" name="Slide Number Placeholder 6">
             <a:extLst>
               <a:ext uri="{FF2B5EF4-FFF2-40B4-BE49-F238E27FC236}">
-                <a16:creationId xmlns:a16="http://schemas.microsoft.com/office/drawing/2014/main" id="{76CFE189-E20B-4108-B290-244424336512}"/>
+                <a16:creationId xmlns:a16="http://schemas.microsoft.com/office/drawing/2014/main" xmlns="" id="{76CFE189-E20B-4108-B290-244424336512}"/>
               </a:ext>
             </a:extLst>
           </p:cNvPr>
@@ -4161,10 +4162,10 @@
           <p:cNvPr id="17" name="Oval 16">
             <a:extLst>
               <a:ext uri="{FF2B5EF4-FFF2-40B4-BE49-F238E27FC236}">
-                <a16:creationId xmlns:a16="http://schemas.microsoft.com/office/drawing/2014/main" id="{83C43C1C-00B3-40E0-B073-B8C56206D07D}"/>
+                <a16:creationId xmlns:a16="http://schemas.microsoft.com/office/drawing/2014/main" xmlns="" id="{83C43C1C-00B3-40E0-B073-B8C56206D07D}"/>
               </a:ext>
               <a:ext uri="{C183D7F6-B498-43B3-948B-1728B52AA6E4}">
-                <adec:decorative xmlns:adec="http://schemas.microsoft.com/office/drawing/2017/decorative" val="1"/>
+                <adec:decorative xmlns:adec="http://schemas.microsoft.com/office/drawing/2017/decorative" xmlns="" val="1"/>
               </a:ext>
             </a:extLst>
           </p:cNvPr>
@@ -4279,7 +4280,7 @@
           <p:cNvPr id="2" name="Title 1">
             <a:extLst>
               <a:ext uri="{FF2B5EF4-FFF2-40B4-BE49-F238E27FC236}">
-                <a16:creationId xmlns:a16="http://schemas.microsoft.com/office/drawing/2014/main" id="{AB577394-0A20-4CF6-9066-CFC2C1C9D30F}"/>
+                <a16:creationId xmlns:a16="http://schemas.microsoft.com/office/drawing/2014/main" xmlns="" id="{AB577394-0A20-4CF6-9066-CFC2C1C9D30F}"/>
               </a:ext>
             </a:extLst>
           </p:cNvPr>
@@ -4322,7 +4323,7 @@
           <p:cNvPr id="3" name="Subtitle 2">
             <a:extLst>
               <a:ext uri="{FF2B5EF4-FFF2-40B4-BE49-F238E27FC236}">
-                <a16:creationId xmlns:a16="http://schemas.microsoft.com/office/drawing/2014/main" id="{3F10971F-8922-4B23-9C80-0643D7E35026}"/>
+                <a16:creationId xmlns:a16="http://schemas.microsoft.com/office/drawing/2014/main" xmlns="" id="{3F10971F-8922-4B23-9C80-0643D7E35026}"/>
               </a:ext>
             </a:extLst>
           </p:cNvPr>
@@ -4404,7 +4405,7 @@
           <p:cNvPr id="4" name="Date Placeholder 3">
             <a:extLst>
               <a:ext uri="{FF2B5EF4-FFF2-40B4-BE49-F238E27FC236}">
-                <a16:creationId xmlns:a16="http://schemas.microsoft.com/office/drawing/2014/main" id="{8B1BC074-1090-47AF-BDE8-3859BF574BA6}"/>
+                <a16:creationId xmlns:a16="http://schemas.microsoft.com/office/drawing/2014/main" xmlns="" id="{8B1BC074-1090-47AF-BDE8-3859BF574BA6}"/>
               </a:ext>
             </a:extLst>
           </p:cNvPr>
@@ -4435,7 +4436,7 @@
           <p:cNvPr id="5" name="Footer Placeholder 4">
             <a:extLst>
               <a:ext uri="{FF2B5EF4-FFF2-40B4-BE49-F238E27FC236}">
-                <a16:creationId xmlns:a16="http://schemas.microsoft.com/office/drawing/2014/main" id="{F1D6522F-D41A-4734-8BD1-BD6E5A37D04C}"/>
+                <a16:creationId xmlns:a16="http://schemas.microsoft.com/office/drawing/2014/main" xmlns="" id="{F1D6522F-D41A-4734-8BD1-BD6E5A37D04C}"/>
               </a:ext>
             </a:extLst>
           </p:cNvPr>
@@ -4465,7 +4466,7 @@
           <p:cNvPr id="6" name="Slide Number Placeholder 5">
             <a:extLst>
               <a:ext uri="{FF2B5EF4-FFF2-40B4-BE49-F238E27FC236}">
-                <a16:creationId xmlns:a16="http://schemas.microsoft.com/office/drawing/2014/main" id="{D74D4206-406C-42A3-BBD4-44C043180931}"/>
+                <a16:creationId xmlns:a16="http://schemas.microsoft.com/office/drawing/2014/main" xmlns="" id="{D74D4206-406C-42A3-BBD4-44C043180931}"/>
               </a:ext>
             </a:extLst>
           </p:cNvPr>
@@ -4496,7 +4497,7 @@
           <p:cNvPr id="19" name="Freeform: Shape 18">
             <a:extLst>
               <a:ext uri="{FF2B5EF4-FFF2-40B4-BE49-F238E27FC236}">
-                <a16:creationId xmlns:a16="http://schemas.microsoft.com/office/drawing/2014/main" id="{82184FF4-7029-4ED7-813A-192E60608764}"/>
+                <a16:creationId xmlns:a16="http://schemas.microsoft.com/office/drawing/2014/main" xmlns="" id="{82184FF4-7029-4ED7-813A-192E60608764}"/>
               </a:ext>
             </a:extLst>
           </p:cNvPr>
@@ -4718,7 +4719,7 @@
           <p:cNvPr id="20" name="Oval 19">
             <a:extLst>
               <a:ext uri="{FF2B5EF4-FFF2-40B4-BE49-F238E27FC236}">
-                <a16:creationId xmlns:a16="http://schemas.microsoft.com/office/drawing/2014/main" id="{AAA7AB09-557C-41AD-9113-FF9F68FA1035}"/>
+                <a16:creationId xmlns:a16="http://schemas.microsoft.com/office/drawing/2014/main" xmlns="" id="{AAA7AB09-557C-41AD-9113-FF9F68FA1035}"/>
               </a:ext>
             </a:extLst>
           </p:cNvPr>
@@ -4798,7 +4799,7 @@
           <p:cNvPr id="25" name="Oval 24">
             <a:extLst>
               <a:ext uri="{FF2B5EF4-FFF2-40B4-BE49-F238E27FC236}">
-                <a16:creationId xmlns:a16="http://schemas.microsoft.com/office/drawing/2014/main" id="{EF99ECAA-1F11-4937-BBA6-51935AB44C9D}"/>
+                <a16:creationId xmlns:a16="http://schemas.microsoft.com/office/drawing/2014/main" xmlns="" id="{EF99ECAA-1F11-4937-BBA6-51935AB44C9D}"/>
               </a:ext>
             </a:extLst>
           </p:cNvPr>
@@ -4881,7 +4882,7 @@
           <p:cNvPr id="34" name="Group 33">
             <a:extLst>
               <a:ext uri="{FF2B5EF4-FFF2-40B4-BE49-F238E27FC236}">
-                <a16:creationId xmlns:a16="http://schemas.microsoft.com/office/drawing/2014/main" id="{79DE9FAB-6BBA-4CFE-B67D-77B47F01ECA4}"/>
+                <a16:creationId xmlns:a16="http://schemas.microsoft.com/office/drawing/2014/main" xmlns="" id="{79DE9FAB-6BBA-4CFE-B67D-77B47F01ECA4}"/>
               </a:ext>
             </a:extLst>
           </p:cNvPr>
@@ -4901,7 +4902,7 @@
             <p:cNvPr id="35" name="Freeform: Shape 34">
               <a:extLst>
                 <a:ext uri="{FF2B5EF4-FFF2-40B4-BE49-F238E27FC236}">
-                  <a16:creationId xmlns:a16="http://schemas.microsoft.com/office/drawing/2014/main" id="{79FAC916-D9BB-4794-81B4-7C47C67E850D}"/>
+                  <a16:creationId xmlns:a16="http://schemas.microsoft.com/office/drawing/2014/main" xmlns="" id="{79FAC916-D9BB-4794-81B4-7C47C67E850D}"/>
                 </a:ext>
               </a:extLst>
             </p:cNvPr>
@@ -5041,7 +5042,7 @@
             <p:cNvPr id="36" name="Freeform: Shape 35">
               <a:extLst>
                 <a:ext uri="{FF2B5EF4-FFF2-40B4-BE49-F238E27FC236}">
-                  <a16:creationId xmlns:a16="http://schemas.microsoft.com/office/drawing/2014/main" id="{B5CA2231-7A65-4D16-8400-A210CC41DB73}"/>
+                  <a16:creationId xmlns:a16="http://schemas.microsoft.com/office/drawing/2014/main" xmlns="" id="{B5CA2231-7A65-4D16-8400-A210CC41DB73}"/>
                 </a:ext>
               </a:extLst>
             </p:cNvPr>
@@ -5183,7 +5184,7 @@
             <p:cNvPr id="37" name="Oval 36">
               <a:extLst>
                 <a:ext uri="{FF2B5EF4-FFF2-40B4-BE49-F238E27FC236}">
-                  <a16:creationId xmlns:a16="http://schemas.microsoft.com/office/drawing/2014/main" id="{4B089C8C-B82B-4704-88E2-E857A5E21529}"/>
+                  <a16:creationId xmlns:a16="http://schemas.microsoft.com/office/drawing/2014/main" xmlns="" id="{4B089C8C-B82B-4704-88E2-E857A5E21529}"/>
                 </a:ext>
               </a:extLst>
             </p:cNvPr>
@@ -5252,7 +5253,7 @@
             <p:cNvPr id="38" name="Oval 37">
               <a:extLst>
                 <a:ext uri="{FF2B5EF4-FFF2-40B4-BE49-F238E27FC236}">
-                  <a16:creationId xmlns:a16="http://schemas.microsoft.com/office/drawing/2014/main" id="{434B90C8-5B4D-456E-AD99-80EF748FDD72}"/>
+                  <a16:creationId xmlns:a16="http://schemas.microsoft.com/office/drawing/2014/main" xmlns="" id="{434B90C8-5B4D-456E-AD99-80EF748FDD72}"/>
                 </a:ext>
               </a:extLst>
             </p:cNvPr>
@@ -5352,7 +5353,7 @@
           <p:cNvPr id="22" name="Oval 21">
             <a:extLst>
               <a:ext uri="{FF2B5EF4-FFF2-40B4-BE49-F238E27FC236}">
-                <a16:creationId xmlns:a16="http://schemas.microsoft.com/office/drawing/2014/main" id="{94729CA3-91C4-4A89-9448-A2F0E409177A}"/>
+                <a16:creationId xmlns:a16="http://schemas.microsoft.com/office/drawing/2014/main" xmlns="" id="{94729CA3-91C4-4A89-9448-A2F0E409177A}"/>
               </a:ext>
             </a:extLst>
           </p:cNvPr>
@@ -5435,7 +5436,7 @@
           <p:cNvPr id="13" name="Group 12">
             <a:extLst>
               <a:ext uri="{FF2B5EF4-FFF2-40B4-BE49-F238E27FC236}">
-                <a16:creationId xmlns:a16="http://schemas.microsoft.com/office/drawing/2014/main" id="{168347B7-45FA-4A01-924D-DC385B720B3E}"/>
+                <a16:creationId xmlns:a16="http://schemas.microsoft.com/office/drawing/2014/main" xmlns="" id="{168347B7-45FA-4A01-924D-DC385B720B3E}"/>
               </a:ext>
             </a:extLst>
           </p:cNvPr>
@@ -5455,7 +5456,7 @@
             <p:cNvPr id="20" name="Freeform: Shape 19">
               <a:extLst>
                 <a:ext uri="{FF2B5EF4-FFF2-40B4-BE49-F238E27FC236}">
-                  <a16:creationId xmlns:a16="http://schemas.microsoft.com/office/drawing/2014/main" id="{31167DA1-25D1-4E60-A62E-42B6F56A96EC}"/>
+                  <a16:creationId xmlns:a16="http://schemas.microsoft.com/office/drawing/2014/main" xmlns="" id="{31167DA1-25D1-4E60-A62E-42B6F56A96EC}"/>
                 </a:ext>
               </a:extLst>
             </p:cNvPr>
@@ -5677,7 +5678,7 @@
             <p:cNvPr id="21" name="Oval 20">
               <a:extLst>
                 <a:ext uri="{FF2B5EF4-FFF2-40B4-BE49-F238E27FC236}">
-                  <a16:creationId xmlns:a16="http://schemas.microsoft.com/office/drawing/2014/main" id="{6B7B7215-A661-477E-91D0-CDBE5564D2B9}"/>
+                  <a16:creationId xmlns:a16="http://schemas.microsoft.com/office/drawing/2014/main" xmlns="" id="{6B7B7215-A661-477E-91D0-CDBE5564D2B9}"/>
                 </a:ext>
               </a:extLst>
             </p:cNvPr>
@@ -5758,7 +5759,7 @@
           <p:cNvPr id="2" name="Title 1">
             <a:extLst>
               <a:ext uri="{FF2B5EF4-FFF2-40B4-BE49-F238E27FC236}">
-                <a16:creationId xmlns:a16="http://schemas.microsoft.com/office/drawing/2014/main" id="{8978E540-142B-4A82-9C3F-E61BC190AEED}"/>
+                <a16:creationId xmlns:a16="http://schemas.microsoft.com/office/drawing/2014/main" xmlns="" id="{8978E540-142B-4A82-9C3F-E61BC190AEED}"/>
               </a:ext>
             </a:extLst>
           </p:cNvPr>
@@ -5801,7 +5802,7 @@
           <p:cNvPr id="3" name="Content Placeholder 2">
             <a:extLst>
               <a:ext uri="{FF2B5EF4-FFF2-40B4-BE49-F238E27FC236}">
-                <a16:creationId xmlns:a16="http://schemas.microsoft.com/office/drawing/2014/main" id="{02C6BF36-D4F5-4363-B440-BDAE50BBD4B6}"/>
+                <a16:creationId xmlns:a16="http://schemas.microsoft.com/office/drawing/2014/main" xmlns="" id="{02C6BF36-D4F5-4363-B440-BDAE50BBD4B6}"/>
               </a:ext>
             </a:extLst>
           </p:cNvPr>
@@ -5866,7 +5867,7 @@
           <p:cNvPr id="4" name="Content Placeholder 3">
             <a:extLst>
               <a:ext uri="{FF2B5EF4-FFF2-40B4-BE49-F238E27FC236}">
-                <a16:creationId xmlns:a16="http://schemas.microsoft.com/office/drawing/2014/main" id="{F8362910-87AA-4E67-992D-8D4822FD89FE}"/>
+                <a16:creationId xmlns:a16="http://schemas.microsoft.com/office/drawing/2014/main" xmlns="" id="{F8362910-87AA-4E67-992D-8D4822FD89FE}"/>
               </a:ext>
             </a:extLst>
           </p:cNvPr>
@@ -5931,7 +5932,7 @@
           <p:cNvPr id="5" name="Date Placeholder 4">
             <a:extLst>
               <a:ext uri="{FF2B5EF4-FFF2-40B4-BE49-F238E27FC236}">
-                <a16:creationId xmlns:a16="http://schemas.microsoft.com/office/drawing/2014/main" id="{BB99A8AF-0998-4613-B1D8-C14ECBFFDF67}"/>
+                <a16:creationId xmlns:a16="http://schemas.microsoft.com/office/drawing/2014/main" xmlns="" id="{BB99A8AF-0998-4613-B1D8-C14ECBFFDF67}"/>
               </a:ext>
             </a:extLst>
           </p:cNvPr>
@@ -5961,7 +5962,7 @@
           <p:cNvPr id="6" name="Footer Placeholder 5">
             <a:extLst>
               <a:ext uri="{FF2B5EF4-FFF2-40B4-BE49-F238E27FC236}">
-                <a16:creationId xmlns:a16="http://schemas.microsoft.com/office/drawing/2014/main" id="{66E44EAA-B8A9-4428-A9DF-1174DA940990}"/>
+                <a16:creationId xmlns:a16="http://schemas.microsoft.com/office/drawing/2014/main" xmlns="" id="{66E44EAA-B8A9-4428-A9DF-1174DA940990}"/>
               </a:ext>
             </a:extLst>
           </p:cNvPr>
@@ -5991,7 +5992,7 @@
           <p:cNvPr id="7" name="Slide Number Placeholder 6">
             <a:extLst>
               <a:ext uri="{FF2B5EF4-FFF2-40B4-BE49-F238E27FC236}">
-                <a16:creationId xmlns:a16="http://schemas.microsoft.com/office/drawing/2014/main" id="{19E5C381-C899-4BF9-B584-2D78074D1CB2}"/>
+                <a16:creationId xmlns:a16="http://schemas.microsoft.com/office/drawing/2014/main" xmlns="" id="{19E5C381-C899-4BF9-B584-2D78074D1CB2}"/>
               </a:ext>
             </a:extLst>
           </p:cNvPr>
@@ -6052,7 +6053,7 @@
           <p:cNvPr id="2" name="Date Placeholder 1">
             <a:extLst>
               <a:ext uri="{FF2B5EF4-FFF2-40B4-BE49-F238E27FC236}">
-                <a16:creationId xmlns:a16="http://schemas.microsoft.com/office/drawing/2014/main" id="{AB81B449-7B97-41DC-B23F-65EDCBD316A6}"/>
+                <a16:creationId xmlns:a16="http://schemas.microsoft.com/office/drawing/2014/main" xmlns="" id="{AB81B449-7B97-41DC-B23F-65EDCBD316A6}"/>
               </a:ext>
             </a:extLst>
           </p:cNvPr>
@@ -6082,7 +6083,7 @@
           <p:cNvPr id="3" name="Footer Placeholder 2">
             <a:extLst>
               <a:ext uri="{FF2B5EF4-FFF2-40B4-BE49-F238E27FC236}">
-                <a16:creationId xmlns:a16="http://schemas.microsoft.com/office/drawing/2014/main" id="{7C6B46D5-337B-4906-8412-4EEA3884FA7E}"/>
+                <a16:creationId xmlns:a16="http://schemas.microsoft.com/office/drawing/2014/main" xmlns="" id="{7C6B46D5-337B-4906-8412-4EEA3884FA7E}"/>
               </a:ext>
             </a:extLst>
           </p:cNvPr>
@@ -6112,7 +6113,7 @@
           <p:cNvPr id="4" name="Slide Number Placeholder 3">
             <a:extLst>
               <a:ext uri="{FF2B5EF4-FFF2-40B4-BE49-F238E27FC236}">
-                <a16:creationId xmlns:a16="http://schemas.microsoft.com/office/drawing/2014/main" id="{E436F230-C9A7-407A-B923-873839C8D8A0}"/>
+                <a16:creationId xmlns:a16="http://schemas.microsoft.com/office/drawing/2014/main" xmlns="" id="{E436F230-C9A7-407A-B923-873839C8D8A0}"/>
               </a:ext>
             </a:extLst>
           </p:cNvPr>
@@ -6173,7 +6174,7 @@
           <p:cNvPr id="8" name="Group 7">
             <a:extLst>
               <a:ext uri="{FF2B5EF4-FFF2-40B4-BE49-F238E27FC236}">
-                <a16:creationId xmlns:a16="http://schemas.microsoft.com/office/drawing/2014/main" id="{778B0BE9-88B0-4883-9BA9-CD594C400EC1}"/>
+                <a16:creationId xmlns:a16="http://schemas.microsoft.com/office/drawing/2014/main" xmlns="" id="{778B0BE9-88B0-4883-9BA9-CD594C400EC1}"/>
               </a:ext>
             </a:extLst>
           </p:cNvPr>
@@ -6193,7 +6194,7 @@
             <p:cNvPr id="11" name="Freeform: Shape 10">
               <a:extLst>
                 <a:ext uri="{FF2B5EF4-FFF2-40B4-BE49-F238E27FC236}">
-                  <a16:creationId xmlns:a16="http://schemas.microsoft.com/office/drawing/2014/main" id="{C59DCBF3-7AFA-4CD1-A918-BC6DDE674E6C}"/>
+                  <a16:creationId xmlns:a16="http://schemas.microsoft.com/office/drawing/2014/main" xmlns="" id="{C59DCBF3-7AFA-4CD1-A918-BC6DDE674E6C}"/>
                 </a:ext>
               </a:extLst>
             </p:cNvPr>
@@ -6415,7 +6416,7 @@
             <p:cNvPr id="12" name="Oval 11">
               <a:extLst>
                 <a:ext uri="{FF2B5EF4-FFF2-40B4-BE49-F238E27FC236}">
-                  <a16:creationId xmlns:a16="http://schemas.microsoft.com/office/drawing/2014/main" id="{06964A02-96E1-4654-9187-DDDE7409F75B}"/>
+                  <a16:creationId xmlns:a16="http://schemas.microsoft.com/office/drawing/2014/main" xmlns="" id="{06964A02-96E1-4654-9187-DDDE7409F75B}"/>
                 </a:ext>
               </a:extLst>
             </p:cNvPr>
@@ -6496,7 +6497,7 @@
           <p:cNvPr id="2" name="Title 1">
             <a:extLst>
               <a:ext uri="{FF2B5EF4-FFF2-40B4-BE49-F238E27FC236}">
-                <a16:creationId xmlns:a16="http://schemas.microsoft.com/office/drawing/2014/main" id="{BF3FF76C-A012-4CDA-8AE7-E9413955716A}"/>
+                <a16:creationId xmlns:a16="http://schemas.microsoft.com/office/drawing/2014/main" xmlns="" id="{BF3FF76C-A012-4CDA-8AE7-E9413955716A}"/>
               </a:ext>
             </a:extLst>
           </p:cNvPr>
@@ -6539,7 +6540,7 @@
           <p:cNvPr id="3" name="Content Placeholder 2">
             <a:extLst>
               <a:ext uri="{FF2B5EF4-FFF2-40B4-BE49-F238E27FC236}">
-                <a16:creationId xmlns:a16="http://schemas.microsoft.com/office/drawing/2014/main" id="{611A4C80-DC38-4641-924F-90D6078CF592}"/>
+                <a16:creationId xmlns:a16="http://schemas.microsoft.com/office/drawing/2014/main" xmlns="" id="{611A4C80-DC38-4641-924F-90D6078CF592}"/>
               </a:ext>
             </a:extLst>
           </p:cNvPr>
@@ -6632,7 +6633,7 @@
           <p:cNvPr id="4" name="Text Placeholder 3">
             <a:extLst>
               <a:ext uri="{FF2B5EF4-FFF2-40B4-BE49-F238E27FC236}">
-                <a16:creationId xmlns:a16="http://schemas.microsoft.com/office/drawing/2014/main" id="{82C42771-D3A7-4072-85DC-B7C5E530E8AA}"/>
+                <a16:creationId xmlns:a16="http://schemas.microsoft.com/office/drawing/2014/main" xmlns="" id="{82C42771-D3A7-4072-85DC-B7C5E530E8AA}"/>
               </a:ext>
             </a:extLst>
           </p:cNvPr>
@@ -6705,7 +6706,7 @@
           <p:cNvPr id="5" name="Date Placeholder 4">
             <a:extLst>
               <a:ext uri="{FF2B5EF4-FFF2-40B4-BE49-F238E27FC236}">
-                <a16:creationId xmlns:a16="http://schemas.microsoft.com/office/drawing/2014/main" id="{EBD47AB1-6EB5-4E2C-B4A7-42DC643E9FF9}"/>
+                <a16:creationId xmlns:a16="http://schemas.microsoft.com/office/drawing/2014/main" xmlns="" id="{EBD47AB1-6EB5-4E2C-B4A7-42DC643E9FF9}"/>
               </a:ext>
             </a:extLst>
           </p:cNvPr>
@@ -6735,7 +6736,7 @@
           <p:cNvPr id="6" name="Footer Placeholder 5">
             <a:extLst>
               <a:ext uri="{FF2B5EF4-FFF2-40B4-BE49-F238E27FC236}">
-                <a16:creationId xmlns:a16="http://schemas.microsoft.com/office/drawing/2014/main" id="{5BA9D15F-B6ED-46E1-9840-0B625880EE4B}"/>
+                <a16:creationId xmlns:a16="http://schemas.microsoft.com/office/drawing/2014/main" xmlns="" id="{5BA9D15F-B6ED-46E1-9840-0B625880EE4B}"/>
               </a:ext>
             </a:extLst>
           </p:cNvPr>
@@ -6765,7 +6766,7 @@
           <p:cNvPr id="7" name="Slide Number Placeholder 6">
             <a:extLst>
               <a:ext uri="{FF2B5EF4-FFF2-40B4-BE49-F238E27FC236}">
-                <a16:creationId xmlns:a16="http://schemas.microsoft.com/office/drawing/2014/main" id="{CDAEB023-7A5E-4087-B75E-A38A80EE5D01}"/>
+                <a16:creationId xmlns:a16="http://schemas.microsoft.com/office/drawing/2014/main" xmlns="" id="{CDAEB023-7A5E-4087-B75E-A38A80EE5D01}"/>
               </a:ext>
             </a:extLst>
           </p:cNvPr>
@@ -6826,7 +6827,7 @@
           <p:cNvPr id="5" name="Title 1">
             <a:extLst>
               <a:ext uri="{FF2B5EF4-FFF2-40B4-BE49-F238E27FC236}">
-                <a16:creationId xmlns:a16="http://schemas.microsoft.com/office/drawing/2014/main" id="{C0923D16-1EC5-4C17-ABA8-B13A1256B36F}"/>
+                <a16:creationId xmlns:a16="http://schemas.microsoft.com/office/drawing/2014/main" xmlns="" id="{C0923D16-1EC5-4C17-ABA8-B13A1256B36F}"/>
               </a:ext>
             </a:extLst>
           </p:cNvPr>
@@ -6865,7 +6866,7 @@
           <p:cNvPr id="7" name="Content Placeholder 2">
             <a:extLst>
               <a:ext uri="{FF2B5EF4-FFF2-40B4-BE49-F238E27FC236}">
-                <a16:creationId xmlns:a16="http://schemas.microsoft.com/office/drawing/2014/main" id="{50294D8B-CF64-4C26-8C78-57A375E7D33B}"/>
+                <a16:creationId xmlns:a16="http://schemas.microsoft.com/office/drawing/2014/main" xmlns="" id="{50294D8B-CF64-4C26-8C78-57A375E7D33B}"/>
               </a:ext>
             </a:extLst>
           </p:cNvPr>
@@ -6910,7 +6911,7 @@
           <p:cNvPr id="17" name="Picture Placeholder 16">
             <a:extLst>
               <a:ext uri="{FF2B5EF4-FFF2-40B4-BE49-F238E27FC236}">
-                <a16:creationId xmlns:a16="http://schemas.microsoft.com/office/drawing/2014/main" id="{67BCF456-426F-435B-8DF0-A32A44F5A889}"/>
+                <a16:creationId xmlns:a16="http://schemas.microsoft.com/office/drawing/2014/main" xmlns="" id="{67BCF456-426F-435B-8DF0-A32A44F5A889}"/>
               </a:ext>
             </a:extLst>
           </p:cNvPr>
@@ -7010,7 +7011,7 @@
           <p:cNvPr id="22" name="Picture Placeholder 21">
             <a:extLst>
               <a:ext uri="{FF2B5EF4-FFF2-40B4-BE49-F238E27FC236}">
-                <a16:creationId xmlns:a16="http://schemas.microsoft.com/office/drawing/2014/main" id="{4813A609-7079-46D5-9C1D-52004ABDAC9D}"/>
+                <a16:creationId xmlns:a16="http://schemas.microsoft.com/office/drawing/2014/main" xmlns="" id="{4813A609-7079-46D5-9C1D-52004ABDAC9D}"/>
               </a:ext>
             </a:extLst>
           </p:cNvPr>
@@ -7110,7 +7111,7 @@
           <p:cNvPr id="25" name="Picture Placeholder 24">
             <a:extLst>
               <a:ext uri="{FF2B5EF4-FFF2-40B4-BE49-F238E27FC236}">
-                <a16:creationId xmlns:a16="http://schemas.microsoft.com/office/drawing/2014/main" id="{A14F21DF-D5E0-4C6C-BA2C-D69D65DBB18E}"/>
+                <a16:creationId xmlns:a16="http://schemas.microsoft.com/office/drawing/2014/main" xmlns="" id="{A14F21DF-D5E0-4C6C-BA2C-D69D65DBB18E}"/>
               </a:ext>
             </a:extLst>
           </p:cNvPr>
@@ -7210,7 +7211,7 @@
           <p:cNvPr id="2" name="Date Placeholder 1">
             <a:extLst>
               <a:ext uri="{FF2B5EF4-FFF2-40B4-BE49-F238E27FC236}">
-                <a16:creationId xmlns:a16="http://schemas.microsoft.com/office/drawing/2014/main" id="{AB81B449-7B97-41DC-B23F-65EDCBD316A6}"/>
+                <a16:creationId xmlns:a16="http://schemas.microsoft.com/office/drawing/2014/main" xmlns="" id="{AB81B449-7B97-41DC-B23F-65EDCBD316A6}"/>
               </a:ext>
             </a:extLst>
           </p:cNvPr>
@@ -7240,7 +7241,7 @@
           <p:cNvPr id="3" name="Footer Placeholder 2">
             <a:extLst>
               <a:ext uri="{FF2B5EF4-FFF2-40B4-BE49-F238E27FC236}">
-                <a16:creationId xmlns:a16="http://schemas.microsoft.com/office/drawing/2014/main" id="{7C6B46D5-337B-4906-8412-4EEA3884FA7E}"/>
+                <a16:creationId xmlns:a16="http://schemas.microsoft.com/office/drawing/2014/main" xmlns="" id="{7C6B46D5-337B-4906-8412-4EEA3884FA7E}"/>
               </a:ext>
             </a:extLst>
           </p:cNvPr>
@@ -7270,7 +7271,7 @@
           <p:cNvPr id="4" name="Slide Number Placeholder 3">
             <a:extLst>
               <a:ext uri="{FF2B5EF4-FFF2-40B4-BE49-F238E27FC236}">
-                <a16:creationId xmlns:a16="http://schemas.microsoft.com/office/drawing/2014/main" id="{E436F230-C9A7-407A-B923-873839C8D8A0}"/>
+                <a16:creationId xmlns:a16="http://schemas.microsoft.com/office/drawing/2014/main" xmlns="" id="{E436F230-C9A7-407A-B923-873839C8D8A0}"/>
               </a:ext>
             </a:extLst>
           </p:cNvPr>
@@ -7301,10 +7302,10 @@
           <p:cNvPr id="6" name="Oval 5">
             <a:extLst>
               <a:ext uri="{FF2B5EF4-FFF2-40B4-BE49-F238E27FC236}">
-                <a16:creationId xmlns:a16="http://schemas.microsoft.com/office/drawing/2014/main" id="{92FF63B4-C261-4597-9EE0-811D250B9D21}"/>
+                <a16:creationId xmlns:a16="http://schemas.microsoft.com/office/drawing/2014/main" xmlns="" id="{92FF63B4-C261-4597-9EE0-811D250B9D21}"/>
               </a:ext>
               <a:ext uri="{C183D7F6-B498-43B3-948B-1728B52AA6E4}">
-                <adec:decorative xmlns:adec="http://schemas.microsoft.com/office/drawing/2017/decorative" val="1"/>
+                <adec:decorative xmlns:adec="http://schemas.microsoft.com/office/drawing/2017/decorative" xmlns="" val="1"/>
               </a:ext>
             </a:extLst>
           </p:cNvPr>
@@ -7387,10 +7388,10 @@
           <p:cNvPr id="10" name="Group 9">
             <a:extLst>
               <a:ext uri="{FF2B5EF4-FFF2-40B4-BE49-F238E27FC236}">
-                <a16:creationId xmlns:a16="http://schemas.microsoft.com/office/drawing/2014/main" id="{F92CF088-7F97-4A11-8A81-0EF641F6986F}"/>
+                <a16:creationId xmlns:a16="http://schemas.microsoft.com/office/drawing/2014/main" xmlns="" id="{F92CF088-7F97-4A11-8A81-0EF641F6986F}"/>
               </a:ext>
               <a:ext uri="{C183D7F6-B498-43B3-948B-1728B52AA6E4}">
-                <adec:decorative xmlns:adec="http://schemas.microsoft.com/office/drawing/2017/decorative" val="1"/>
+                <adec:decorative xmlns:adec="http://schemas.microsoft.com/office/drawing/2017/decorative" xmlns="" val="1"/>
               </a:ext>
             </a:extLst>
           </p:cNvPr>
@@ -7410,7 +7411,7 @@
             <p:cNvPr id="11" name="Freeform: Shape 10">
               <a:extLst>
                 <a:ext uri="{FF2B5EF4-FFF2-40B4-BE49-F238E27FC236}">
-                  <a16:creationId xmlns:a16="http://schemas.microsoft.com/office/drawing/2014/main" id="{165B23B7-CE74-4974-ABD8-BFA31D583416}"/>
+                  <a16:creationId xmlns:a16="http://schemas.microsoft.com/office/drawing/2014/main" xmlns="" id="{165B23B7-CE74-4974-ABD8-BFA31D583416}"/>
                 </a:ext>
               </a:extLst>
             </p:cNvPr>
@@ -7632,7 +7633,7 @@
             <p:cNvPr id="12" name="Oval 11">
               <a:extLst>
                 <a:ext uri="{FF2B5EF4-FFF2-40B4-BE49-F238E27FC236}">
-                  <a16:creationId xmlns:a16="http://schemas.microsoft.com/office/drawing/2014/main" id="{FF99BB1F-6C9D-4972-9EF4-98ACD7BE71E5}"/>
+                  <a16:creationId xmlns:a16="http://schemas.microsoft.com/office/drawing/2014/main" xmlns="" id="{FF99BB1F-6C9D-4972-9EF4-98ACD7BE71E5}"/>
                 </a:ext>
               </a:extLst>
             </p:cNvPr>
@@ -7745,7 +7746,7 @@
           <p:cNvPr id="9" name="Title 1">
             <a:extLst>
               <a:ext uri="{FF2B5EF4-FFF2-40B4-BE49-F238E27FC236}">
-                <a16:creationId xmlns:a16="http://schemas.microsoft.com/office/drawing/2014/main" id="{A458B3A1-C77D-4AFC-B2C8-79520B53C452}"/>
+                <a16:creationId xmlns:a16="http://schemas.microsoft.com/office/drawing/2014/main" xmlns="" id="{A458B3A1-C77D-4AFC-B2C8-79520B53C452}"/>
               </a:ext>
             </a:extLst>
           </p:cNvPr>
@@ -7781,7 +7782,7 @@
           <p:cNvPr id="12" name="Picture Placeholder 11">
             <a:extLst>
               <a:ext uri="{FF2B5EF4-FFF2-40B4-BE49-F238E27FC236}">
-                <a16:creationId xmlns:a16="http://schemas.microsoft.com/office/drawing/2014/main" id="{F551DA26-B267-4F28-B4D0-65B3EF6E1112}"/>
+                <a16:creationId xmlns:a16="http://schemas.microsoft.com/office/drawing/2014/main" xmlns="" id="{F551DA26-B267-4F28-B4D0-65B3EF6E1112}"/>
               </a:ext>
             </a:extLst>
           </p:cNvPr>
@@ -7819,7 +7820,7 @@
           <p:cNvPr id="18" name="Picture Placeholder 11">
             <a:extLst>
               <a:ext uri="{FF2B5EF4-FFF2-40B4-BE49-F238E27FC236}">
-                <a16:creationId xmlns:a16="http://schemas.microsoft.com/office/drawing/2014/main" id="{95544A62-DA23-4840-99DE-09AFC8F4DC48}"/>
+                <a16:creationId xmlns:a16="http://schemas.microsoft.com/office/drawing/2014/main" xmlns="" id="{95544A62-DA23-4840-99DE-09AFC8F4DC48}"/>
               </a:ext>
             </a:extLst>
           </p:cNvPr>
@@ -7857,7 +7858,7 @@
           <p:cNvPr id="19" name="Picture Placeholder 11">
             <a:extLst>
               <a:ext uri="{FF2B5EF4-FFF2-40B4-BE49-F238E27FC236}">
-                <a16:creationId xmlns:a16="http://schemas.microsoft.com/office/drawing/2014/main" id="{0C91AF30-C5BB-4601-BDEB-E60C93A16933}"/>
+                <a16:creationId xmlns:a16="http://schemas.microsoft.com/office/drawing/2014/main" xmlns="" id="{0C91AF30-C5BB-4601-BDEB-E60C93A16933}"/>
               </a:ext>
             </a:extLst>
           </p:cNvPr>
@@ -7895,7 +7896,7 @@
           <p:cNvPr id="20" name="Picture Placeholder 11">
             <a:extLst>
               <a:ext uri="{FF2B5EF4-FFF2-40B4-BE49-F238E27FC236}">
-                <a16:creationId xmlns:a16="http://schemas.microsoft.com/office/drawing/2014/main" id="{5B625AA5-EA5B-4115-A461-DA2C7087D83E}"/>
+                <a16:creationId xmlns:a16="http://schemas.microsoft.com/office/drawing/2014/main" xmlns="" id="{5B625AA5-EA5B-4115-A461-DA2C7087D83E}"/>
               </a:ext>
             </a:extLst>
           </p:cNvPr>
@@ -7933,7 +7934,7 @@
           <p:cNvPr id="2" name="Date Placeholder 1">
             <a:extLst>
               <a:ext uri="{FF2B5EF4-FFF2-40B4-BE49-F238E27FC236}">
-                <a16:creationId xmlns:a16="http://schemas.microsoft.com/office/drawing/2014/main" id="{AB81B449-7B97-41DC-B23F-65EDCBD316A6}"/>
+                <a16:creationId xmlns:a16="http://schemas.microsoft.com/office/drawing/2014/main" xmlns="" id="{AB81B449-7B97-41DC-B23F-65EDCBD316A6}"/>
               </a:ext>
             </a:extLst>
           </p:cNvPr>
@@ -7963,7 +7964,7 @@
           <p:cNvPr id="3" name="Footer Placeholder 2">
             <a:extLst>
               <a:ext uri="{FF2B5EF4-FFF2-40B4-BE49-F238E27FC236}">
-                <a16:creationId xmlns:a16="http://schemas.microsoft.com/office/drawing/2014/main" id="{7C6B46D5-337B-4906-8412-4EEA3884FA7E}"/>
+                <a16:creationId xmlns:a16="http://schemas.microsoft.com/office/drawing/2014/main" xmlns="" id="{7C6B46D5-337B-4906-8412-4EEA3884FA7E}"/>
               </a:ext>
             </a:extLst>
           </p:cNvPr>
@@ -7993,7 +7994,7 @@
           <p:cNvPr id="4" name="Slide Number Placeholder 3">
             <a:extLst>
               <a:ext uri="{FF2B5EF4-FFF2-40B4-BE49-F238E27FC236}">
-                <a16:creationId xmlns:a16="http://schemas.microsoft.com/office/drawing/2014/main" id="{E436F230-C9A7-407A-B923-873839C8D8A0}"/>
+                <a16:creationId xmlns:a16="http://schemas.microsoft.com/office/drawing/2014/main" xmlns="" id="{E436F230-C9A7-407A-B923-873839C8D8A0}"/>
               </a:ext>
             </a:extLst>
           </p:cNvPr>
@@ -8024,7 +8025,7 @@
           <p:cNvPr id="11" name="Content Placeholder 6">
             <a:extLst>
               <a:ext uri="{FF2B5EF4-FFF2-40B4-BE49-F238E27FC236}">
-                <a16:creationId xmlns:a16="http://schemas.microsoft.com/office/drawing/2014/main" id="{1B1AE41C-3196-4E6F-A3A8-313A92677FF3}"/>
+                <a16:creationId xmlns:a16="http://schemas.microsoft.com/office/drawing/2014/main" xmlns="" id="{1B1AE41C-3196-4E6F-A3A8-313A92677FF3}"/>
               </a:ext>
             </a:extLst>
           </p:cNvPr>
@@ -8120,7 +8121,7 @@
           <p:cNvPr id="8" name="Picture Placeholder 7">
             <a:extLst>
               <a:ext uri="{FF2B5EF4-FFF2-40B4-BE49-F238E27FC236}">
-                <a16:creationId xmlns:a16="http://schemas.microsoft.com/office/drawing/2014/main" id="{F75B2FBE-0C5C-48AA-8D7F-9D5B7373CC9A}"/>
+                <a16:creationId xmlns:a16="http://schemas.microsoft.com/office/drawing/2014/main" xmlns="" id="{F75B2FBE-0C5C-48AA-8D7F-9D5B7373CC9A}"/>
               </a:ext>
             </a:extLst>
           </p:cNvPr>
@@ -8156,7 +8157,7 @@
           <p:cNvPr id="4" name="Date Placeholder 3">
             <a:extLst>
               <a:ext uri="{FF2B5EF4-FFF2-40B4-BE49-F238E27FC236}">
-                <a16:creationId xmlns:a16="http://schemas.microsoft.com/office/drawing/2014/main" id="{56403DDF-462A-45CE-931B-010AB4F73C3F}"/>
+                <a16:creationId xmlns:a16="http://schemas.microsoft.com/office/drawing/2014/main" xmlns="" id="{56403DDF-462A-45CE-931B-010AB4F73C3F}"/>
               </a:ext>
             </a:extLst>
           </p:cNvPr>
@@ -8184,7 +8185,7 @@
           <p:cNvPr id="5" name="Footer Placeholder 4">
             <a:extLst>
               <a:ext uri="{FF2B5EF4-FFF2-40B4-BE49-F238E27FC236}">
-                <a16:creationId xmlns:a16="http://schemas.microsoft.com/office/drawing/2014/main" id="{39E10702-2ACF-4768-9E91-8CB87B89594D}"/>
+                <a16:creationId xmlns:a16="http://schemas.microsoft.com/office/drawing/2014/main" xmlns="" id="{39E10702-2ACF-4768-9E91-8CB87B89594D}"/>
               </a:ext>
             </a:extLst>
           </p:cNvPr>
@@ -8212,7 +8213,7 @@
           <p:cNvPr id="6" name="Slide Number Placeholder 5">
             <a:extLst>
               <a:ext uri="{FF2B5EF4-FFF2-40B4-BE49-F238E27FC236}">
-                <a16:creationId xmlns:a16="http://schemas.microsoft.com/office/drawing/2014/main" id="{E8DFA722-391E-4FCF-8E15-0D7E2EC02B63}"/>
+                <a16:creationId xmlns:a16="http://schemas.microsoft.com/office/drawing/2014/main" xmlns="" id="{E8DFA722-391E-4FCF-8E15-0D7E2EC02B63}"/>
               </a:ext>
             </a:extLst>
           </p:cNvPr>
@@ -8241,10 +8242,10 @@
           <p:cNvPr id="13" name="Rectangle 12">
             <a:extLst>
               <a:ext uri="{FF2B5EF4-FFF2-40B4-BE49-F238E27FC236}">
-                <a16:creationId xmlns:a16="http://schemas.microsoft.com/office/drawing/2014/main" id="{80517979-166D-4AAA-ABBC-0C3E5C2ECF37}"/>
+                <a16:creationId xmlns:a16="http://schemas.microsoft.com/office/drawing/2014/main" xmlns="" id="{80517979-166D-4AAA-ABBC-0C3E5C2ECF37}"/>
               </a:ext>
               <a:ext uri="{C183D7F6-B498-43B3-948B-1728B52AA6E4}">
-                <adec:decorative xmlns:adec="http://schemas.microsoft.com/office/drawing/2017/decorative" val="1"/>
+                <adec:decorative xmlns:adec="http://schemas.microsoft.com/office/drawing/2017/decorative" xmlns="" val="1"/>
               </a:ext>
             </a:extLst>
           </p:cNvPr>
@@ -8309,7 +8310,7 @@
           <p:cNvPr id="14" name="Rectangle 13">
             <a:extLst>
               <a:ext uri="{FF2B5EF4-FFF2-40B4-BE49-F238E27FC236}">
-                <a16:creationId xmlns:a16="http://schemas.microsoft.com/office/drawing/2014/main" id="{4E111559-B769-4E2A-A891-97B3C4AA6BAC}"/>
+                <a16:creationId xmlns:a16="http://schemas.microsoft.com/office/drawing/2014/main" xmlns="" id="{4E111559-B769-4E2A-A891-97B3C4AA6BAC}"/>
               </a:ext>
             </a:extLst>
           </p:cNvPr>
@@ -8374,7 +8375,7 @@
           <p:cNvPr id="15" name="Title 1">
             <a:extLst>
               <a:ext uri="{FF2B5EF4-FFF2-40B4-BE49-F238E27FC236}">
-                <a16:creationId xmlns:a16="http://schemas.microsoft.com/office/drawing/2014/main" id="{754E1219-253E-4FEF-A576-83857F44BA01}"/>
+                <a16:creationId xmlns:a16="http://schemas.microsoft.com/office/drawing/2014/main" xmlns="" id="{754E1219-253E-4FEF-A576-83857F44BA01}"/>
               </a:ext>
             </a:extLst>
           </p:cNvPr>
@@ -8414,7 +8415,7 @@
           <p:cNvPr id="16" name="Subtitle 2">
             <a:extLst>
               <a:ext uri="{FF2B5EF4-FFF2-40B4-BE49-F238E27FC236}">
-                <a16:creationId xmlns:a16="http://schemas.microsoft.com/office/drawing/2014/main" id="{93411FC5-0B5A-4566-9984-827485AF9265}"/>
+                <a16:creationId xmlns:a16="http://schemas.microsoft.com/office/drawing/2014/main" xmlns="" id="{93411FC5-0B5A-4566-9984-827485AF9265}"/>
               </a:ext>
             </a:extLst>
           </p:cNvPr>
@@ -8502,7 +8503,7 @@
           <p:cNvPr id="8" name="Picture Placeholder 7">
             <a:extLst>
               <a:ext uri="{FF2B5EF4-FFF2-40B4-BE49-F238E27FC236}">
-                <a16:creationId xmlns:a16="http://schemas.microsoft.com/office/drawing/2014/main" id="{F75B2FBE-0C5C-48AA-8D7F-9D5B7373CC9A}"/>
+                <a16:creationId xmlns:a16="http://schemas.microsoft.com/office/drawing/2014/main" xmlns="" id="{F75B2FBE-0C5C-48AA-8D7F-9D5B7373CC9A}"/>
               </a:ext>
             </a:extLst>
           </p:cNvPr>
@@ -8538,7 +8539,7 @@
           <p:cNvPr id="16" name="Subtitle 2">
             <a:extLst>
               <a:ext uri="{FF2B5EF4-FFF2-40B4-BE49-F238E27FC236}">
-                <a16:creationId xmlns:a16="http://schemas.microsoft.com/office/drawing/2014/main" id="{93411FC5-0B5A-4566-9984-827485AF9265}"/>
+                <a16:creationId xmlns:a16="http://schemas.microsoft.com/office/drawing/2014/main" xmlns="" id="{93411FC5-0B5A-4566-9984-827485AF9265}"/>
               </a:ext>
             </a:extLst>
           </p:cNvPr>
@@ -8609,7 +8610,7 @@
           <p:cNvPr id="15" name="Title 1">
             <a:extLst>
               <a:ext uri="{FF2B5EF4-FFF2-40B4-BE49-F238E27FC236}">
-                <a16:creationId xmlns:a16="http://schemas.microsoft.com/office/drawing/2014/main" id="{754E1219-253E-4FEF-A576-83857F44BA01}"/>
+                <a16:creationId xmlns:a16="http://schemas.microsoft.com/office/drawing/2014/main" xmlns="" id="{754E1219-253E-4FEF-A576-83857F44BA01}"/>
               </a:ext>
             </a:extLst>
           </p:cNvPr>
@@ -8698,7 +8699,7 @@
           <p:cNvPr id="12" name="Group 11">
             <a:extLst>
               <a:ext uri="{FF2B5EF4-FFF2-40B4-BE49-F238E27FC236}">
-                <a16:creationId xmlns:a16="http://schemas.microsoft.com/office/drawing/2014/main" id="{3BDBC526-6DCD-4FF6-8395-D8C22E46E527}"/>
+                <a16:creationId xmlns:a16="http://schemas.microsoft.com/office/drawing/2014/main" xmlns="" id="{3BDBC526-6DCD-4FF6-8395-D8C22E46E527}"/>
               </a:ext>
             </a:extLst>
           </p:cNvPr>
@@ -8718,7 +8719,7 @@
             <p:cNvPr id="13" name="Freeform: Shape 12">
               <a:extLst>
                 <a:ext uri="{FF2B5EF4-FFF2-40B4-BE49-F238E27FC236}">
-                  <a16:creationId xmlns:a16="http://schemas.microsoft.com/office/drawing/2014/main" id="{02ECB475-568C-47AC-B16D-2E202DEB2DE0}"/>
+                  <a16:creationId xmlns:a16="http://schemas.microsoft.com/office/drawing/2014/main" xmlns="" id="{02ECB475-568C-47AC-B16D-2E202DEB2DE0}"/>
                 </a:ext>
               </a:extLst>
             </p:cNvPr>
@@ -8862,7 +8863,7 @@
             <p:cNvPr id="14" name="Oval 13">
               <a:extLst>
                 <a:ext uri="{FF2B5EF4-FFF2-40B4-BE49-F238E27FC236}">
-                  <a16:creationId xmlns:a16="http://schemas.microsoft.com/office/drawing/2014/main" id="{080D8764-525A-441E-B58F-068E82F09714}"/>
+                  <a16:creationId xmlns:a16="http://schemas.microsoft.com/office/drawing/2014/main" xmlns="" id="{080D8764-525A-441E-B58F-068E82F09714}"/>
                 </a:ext>
               </a:extLst>
             </p:cNvPr>
@@ -8931,7 +8932,7 @@
             <p:cNvPr id="15" name="Oval 14">
               <a:extLst>
                 <a:ext uri="{FF2B5EF4-FFF2-40B4-BE49-F238E27FC236}">
-                  <a16:creationId xmlns:a16="http://schemas.microsoft.com/office/drawing/2014/main" id="{11196109-6F2B-4738-B2FC-2CCC753AABD4}"/>
+                  <a16:creationId xmlns:a16="http://schemas.microsoft.com/office/drawing/2014/main" xmlns="" id="{11196109-6F2B-4738-B2FC-2CCC753AABD4}"/>
                 </a:ext>
               </a:extLst>
             </p:cNvPr>
@@ -9000,7 +9001,7 @@
             <p:cNvPr id="16" name="Freeform: Shape 15">
               <a:extLst>
                 <a:ext uri="{FF2B5EF4-FFF2-40B4-BE49-F238E27FC236}">
-                  <a16:creationId xmlns:a16="http://schemas.microsoft.com/office/drawing/2014/main" id="{F7E468C2-69B8-470B-85E3-801A3CB1D7E2}"/>
+                  <a16:creationId xmlns:a16="http://schemas.microsoft.com/office/drawing/2014/main" xmlns="" id="{F7E468C2-69B8-470B-85E3-801A3CB1D7E2}"/>
                 </a:ext>
               </a:extLst>
             </p:cNvPr>
@@ -9143,7 +9144,7 @@
           <p:cNvPr id="2" name="Title 1">
             <a:extLst>
               <a:ext uri="{FF2B5EF4-FFF2-40B4-BE49-F238E27FC236}">
-                <a16:creationId xmlns:a16="http://schemas.microsoft.com/office/drawing/2014/main" id="{B1A4B040-51E3-4DA0-B21D-EEE173E7536F}"/>
+                <a16:creationId xmlns:a16="http://schemas.microsoft.com/office/drawing/2014/main" xmlns="" id="{B1A4B040-51E3-4DA0-B21D-EEE173E7536F}"/>
               </a:ext>
             </a:extLst>
           </p:cNvPr>
@@ -9188,7 +9189,7 @@
           <p:cNvPr id="3" name="Content Placeholder 2">
             <a:extLst>
               <a:ext uri="{FF2B5EF4-FFF2-40B4-BE49-F238E27FC236}">
-                <a16:creationId xmlns:a16="http://schemas.microsoft.com/office/drawing/2014/main" id="{F8A2CD90-429B-4A55-B6C8-DD6CE6994118}"/>
+                <a16:creationId xmlns:a16="http://schemas.microsoft.com/office/drawing/2014/main" xmlns="" id="{F8A2CD90-429B-4A55-B6C8-DD6CE6994118}"/>
               </a:ext>
             </a:extLst>
           </p:cNvPr>
@@ -9253,7 +9254,7 @@
           <p:cNvPr id="4" name="Date Placeholder 3">
             <a:extLst>
               <a:ext uri="{FF2B5EF4-FFF2-40B4-BE49-F238E27FC236}">
-                <a16:creationId xmlns:a16="http://schemas.microsoft.com/office/drawing/2014/main" id="{4D4EE704-5DCA-484E-85E0-0E3A7B1C5046}"/>
+                <a16:creationId xmlns:a16="http://schemas.microsoft.com/office/drawing/2014/main" xmlns="" id="{4D4EE704-5DCA-484E-85E0-0E3A7B1C5046}"/>
               </a:ext>
             </a:extLst>
           </p:cNvPr>
@@ -9283,7 +9284,7 @@
           <p:cNvPr id="5" name="Footer Placeholder 4">
             <a:extLst>
               <a:ext uri="{FF2B5EF4-FFF2-40B4-BE49-F238E27FC236}">
-                <a16:creationId xmlns:a16="http://schemas.microsoft.com/office/drawing/2014/main" id="{4CA69B66-1C18-44A2-93F7-97DED26F24AB}"/>
+                <a16:creationId xmlns:a16="http://schemas.microsoft.com/office/drawing/2014/main" xmlns="" id="{4CA69B66-1C18-44A2-93F7-97DED26F24AB}"/>
               </a:ext>
             </a:extLst>
           </p:cNvPr>
@@ -9313,7 +9314,7 @@
           <p:cNvPr id="6" name="Slide Number Placeholder 5">
             <a:extLst>
               <a:ext uri="{FF2B5EF4-FFF2-40B4-BE49-F238E27FC236}">
-                <a16:creationId xmlns:a16="http://schemas.microsoft.com/office/drawing/2014/main" id="{7E44B5A0-66FA-433A-8DC5-C097C63B4DFC}"/>
+                <a16:creationId xmlns:a16="http://schemas.microsoft.com/office/drawing/2014/main" xmlns="" id="{7E44B5A0-66FA-433A-8DC5-C097C63B4DFC}"/>
               </a:ext>
             </a:extLst>
           </p:cNvPr>
@@ -9374,7 +9375,7 @@
           <p:cNvPr id="5" name="Title 1">
             <a:extLst>
               <a:ext uri="{FF2B5EF4-FFF2-40B4-BE49-F238E27FC236}">
-                <a16:creationId xmlns:a16="http://schemas.microsoft.com/office/drawing/2014/main" id="{7062BF5C-3876-4161-B4FF-14CA94D326C6}"/>
+                <a16:creationId xmlns:a16="http://schemas.microsoft.com/office/drawing/2014/main" xmlns="" id="{7062BF5C-3876-4161-B4FF-14CA94D326C6}"/>
               </a:ext>
             </a:extLst>
           </p:cNvPr>
@@ -9414,10 +9415,10 @@
           <p:cNvPr id="8" name="Group 7">
             <a:extLst>
               <a:ext uri="{FF2B5EF4-FFF2-40B4-BE49-F238E27FC236}">
-                <a16:creationId xmlns:a16="http://schemas.microsoft.com/office/drawing/2014/main" id="{B17C5C60-EC4D-410B-9997-0B73289605FD}"/>
+                <a16:creationId xmlns:a16="http://schemas.microsoft.com/office/drawing/2014/main" xmlns="" id="{B17C5C60-EC4D-410B-9997-0B73289605FD}"/>
               </a:ext>
               <a:ext uri="{C183D7F6-B498-43B3-948B-1728B52AA6E4}">
-                <adec:decorative xmlns:adec="http://schemas.microsoft.com/office/drawing/2017/decorative" val="1"/>
+                <adec:decorative xmlns:adec="http://schemas.microsoft.com/office/drawing/2017/decorative" xmlns="" val="1"/>
               </a:ext>
             </a:extLst>
           </p:cNvPr>
@@ -9437,7 +9438,7 @@
             <p:cNvPr id="9" name="Freeform 5">
               <a:extLst>
                 <a:ext uri="{FF2B5EF4-FFF2-40B4-BE49-F238E27FC236}">
-                  <a16:creationId xmlns:a16="http://schemas.microsoft.com/office/drawing/2014/main" id="{0573155C-3428-4F4F-AE66-A519D777EAAE}"/>
+                  <a16:creationId xmlns:a16="http://schemas.microsoft.com/office/drawing/2014/main" xmlns="" id="{0573155C-3428-4F4F-AE66-A519D777EAAE}"/>
                 </a:ext>
               </a:extLst>
             </p:cNvPr>
@@ -9572,7 +9573,7 @@
             <p:cNvPr id="10" name="Freeform 6">
               <a:extLst>
                 <a:ext uri="{FF2B5EF4-FFF2-40B4-BE49-F238E27FC236}">
-                  <a16:creationId xmlns:a16="http://schemas.microsoft.com/office/drawing/2014/main" id="{1853496C-159E-4D47-94B5-0835FB6511BA}"/>
+                  <a16:creationId xmlns:a16="http://schemas.microsoft.com/office/drawing/2014/main" xmlns="" id="{1853496C-159E-4D47-94B5-0835FB6511BA}"/>
                 </a:ext>
               </a:extLst>
             </p:cNvPr>
@@ -9723,7 +9724,7 @@
             <p:cNvPr id="11" name="Freeform 8">
               <a:extLst>
                 <a:ext uri="{FF2B5EF4-FFF2-40B4-BE49-F238E27FC236}">
-                  <a16:creationId xmlns:a16="http://schemas.microsoft.com/office/drawing/2014/main" id="{CE93E330-715B-44E8-84D9-CE166D428DAB}"/>
+                  <a16:creationId xmlns:a16="http://schemas.microsoft.com/office/drawing/2014/main" xmlns="" id="{CE93E330-715B-44E8-84D9-CE166D428DAB}"/>
                 </a:ext>
               </a:extLst>
             </p:cNvPr>
@@ -9876,10 +9877,10 @@
           <p:cNvPr id="12" name="Oval 11">
             <a:extLst>
               <a:ext uri="{FF2B5EF4-FFF2-40B4-BE49-F238E27FC236}">
-                <a16:creationId xmlns:a16="http://schemas.microsoft.com/office/drawing/2014/main" id="{80A2FA6F-99B7-4984-A80C-570644889F02}"/>
+                <a16:creationId xmlns:a16="http://schemas.microsoft.com/office/drawing/2014/main" xmlns="" id="{80A2FA6F-99B7-4984-A80C-570644889F02}"/>
               </a:ext>
               <a:ext uri="{C183D7F6-B498-43B3-948B-1728B52AA6E4}">
-                <adec:decorative xmlns:adec="http://schemas.microsoft.com/office/drawing/2017/decorative" val="1"/>
+                <adec:decorative xmlns:adec="http://schemas.microsoft.com/office/drawing/2017/decorative" xmlns="" val="1"/>
               </a:ext>
             </a:extLst>
           </p:cNvPr>
@@ -9964,7 +9965,7 @@
           <p:cNvPr id="17" name="Content Placeholder 16">
             <a:extLst>
               <a:ext uri="{FF2B5EF4-FFF2-40B4-BE49-F238E27FC236}">
-                <a16:creationId xmlns:a16="http://schemas.microsoft.com/office/drawing/2014/main" id="{439C8C03-81B3-4DE8-B96A-78258E4467CC}"/>
+                <a16:creationId xmlns:a16="http://schemas.microsoft.com/office/drawing/2014/main" xmlns="" id="{439C8C03-81B3-4DE8-B96A-78258E4467CC}"/>
               </a:ext>
             </a:extLst>
           </p:cNvPr>
@@ -10017,7 +10018,7 @@
           <p:cNvPr id="15" name="Picture Placeholder 14">
             <a:extLst>
               <a:ext uri="{FF2B5EF4-FFF2-40B4-BE49-F238E27FC236}">
-                <a16:creationId xmlns:a16="http://schemas.microsoft.com/office/drawing/2014/main" id="{C1FBB56D-C8B1-4ED9-A5DB-72BA636DADF3}"/>
+                <a16:creationId xmlns:a16="http://schemas.microsoft.com/office/drawing/2014/main" xmlns="" id="{C1FBB56D-C8B1-4ED9-A5DB-72BA636DADF3}"/>
               </a:ext>
             </a:extLst>
           </p:cNvPr>
@@ -10117,7 +10118,7 @@
           <p:cNvPr id="2" name="Date Placeholder 1">
             <a:extLst>
               <a:ext uri="{FF2B5EF4-FFF2-40B4-BE49-F238E27FC236}">
-                <a16:creationId xmlns:a16="http://schemas.microsoft.com/office/drawing/2014/main" id="{AB81B449-7B97-41DC-B23F-65EDCBD316A6}"/>
+                <a16:creationId xmlns:a16="http://schemas.microsoft.com/office/drawing/2014/main" xmlns="" id="{AB81B449-7B97-41DC-B23F-65EDCBD316A6}"/>
               </a:ext>
             </a:extLst>
           </p:cNvPr>
@@ -10147,7 +10148,7 @@
           <p:cNvPr id="3" name="Footer Placeholder 2">
             <a:extLst>
               <a:ext uri="{FF2B5EF4-FFF2-40B4-BE49-F238E27FC236}">
-                <a16:creationId xmlns:a16="http://schemas.microsoft.com/office/drawing/2014/main" id="{7C6B46D5-337B-4906-8412-4EEA3884FA7E}"/>
+                <a16:creationId xmlns:a16="http://schemas.microsoft.com/office/drawing/2014/main" xmlns="" id="{7C6B46D5-337B-4906-8412-4EEA3884FA7E}"/>
               </a:ext>
             </a:extLst>
           </p:cNvPr>
@@ -10177,7 +10178,7 @@
           <p:cNvPr id="4" name="Slide Number Placeholder 3">
             <a:extLst>
               <a:ext uri="{FF2B5EF4-FFF2-40B4-BE49-F238E27FC236}">
-                <a16:creationId xmlns:a16="http://schemas.microsoft.com/office/drawing/2014/main" id="{E436F230-C9A7-407A-B923-873839C8D8A0}"/>
+                <a16:creationId xmlns:a16="http://schemas.microsoft.com/office/drawing/2014/main" xmlns="" id="{E436F230-C9A7-407A-B923-873839C8D8A0}"/>
               </a:ext>
             </a:extLst>
           </p:cNvPr>
@@ -10238,10 +10239,10 @@
           <p:cNvPr id="16" name="Rectangle 15">
             <a:extLst>
               <a:ext uri="{FF2B5EF4-FFF2-40B4-BE49-F238E27FC236}">
-                <a16:creationId xmlns:a16="http://schemas.microsoft.com/office/drawing/2014/main" id="{E38C6F9E-A74F-4F54-9409-B6B93DF8CE78}"/>
+                <a16:creationId xmlns:a16="http://schemas.microsoft.com/office/drawing/2014/main" xmlns="" id="{E38C6F9E-A74F-4F54-9409-B6B93DF8CE78}"/>
               </a:ext>
               <a:ext uri="{C183D7F6-B498-43B3-948B-1728B52AA6E4}">
-                <adec:decorative xmlns:adec="http://schemas.microsoft.com/office/drawing/2017/decorative" val="1"/>
+                <adec:decorative xmlns:adec="http://schemas.microsoft.com/office/drawing/2017/decorative" xmlns="" val="1"/>
               </a:ext>
             </a:extLst>
           </p:cNvPr>
@@ -10308,10 +10309,10 @@
           <p:cNvPr id="34" name="Oval 33">
             <a:extLst>
               <a:ext uri="{FF2B5EF4-FFF2-40B4-BE49-F238E27FC236}">
-                <a16:creationId xmlns:a16="http://schemas.microsoft.com/office/drawing/2014/main" id="{6F0F71C5-78A4-4793-9BD4-3DF0EE3E3EB7}"/>
+                <a16:creationId xmlns:a16="http://schemas.microsoft.com/office/drawing/2014/main" xmlns="" id="{6F0F71C5-78A4-4793-9BD4-3DF0EE3E3EB7}"/>
               </a:ext>
               <a:ext uri="{C183D7F6-B498-43B3-948B-1728B52AA6E4}">
-                <adec:decorative xmlns:adec="http://schemas.microsoft.com/office/drawing/2017/decorative" val="1"/>
+                <adec:decorative xmlns:adec="http://schemas.microsoft.com/office/drawing/2017/decorative" xmlns="" val="1"/>
               </a:ext>
             </a:extLst>
           </p:cNvPr>
@@ -10396,7 +10397,7 @@
           <p:cNvPr id="40" name="Title 5">
             <a:extLst>
               <a:ext uri="{FF2B5EF4-FFF2-40B4-BE49-F238E27FC236}">
-                <a16:creationId xmlns:a16="http://schemas.microsoft.com/office/drawing/2014/main" id="{36F60F77-4CC9-4F86-B70A-85012C6588A0}"/>
+                <a16:creationId xmlns:a16="http://schemas.microsoft.com/office/drawing/2014/main" xmlns="" id="{36F60F77-4CC9-4F86-B70A-85012C6588A0}"/>
               </a:ext>
             </a:extLst>
           </p:cNvPr>
@@ -10431,10 +10432,10 @@
           <p:cNvPr id="51" name="Group 50">
             <a:extLst>
               <a:ext uri="{FF2B5EF4-FFF2-40B4-BE49-F238E27FC236}">
-                <a16:creationId xmlns:a16="http://schemas.microsoft.com/office/drawing/2014/main" id="{E6093F87-C1F6-4FAB-B891-6F7D7FC20751}"/>
+                <a16:creationId xmlns:a16="http://schemas.microsoft.com/office/drawing/2014/main" xmlns="" id="{E6093F87-C1F6-4FAB-B891-6F7D7FC20751}"/>
               </a:ext>
               <a:ext uri="{C183D7F6-B498-43B3-948B-1728B52AA6E4}">
-                <adec:decorative xmlns:adec="http://schemas.microsoft.com/office/drawing/2017/decorative" val="1"/>
+                <adec:decorative xmlns:adec="http://schemas.microsoft.com/office/drawing/2017/decorative" xmlns="" val="1"/>
               </a:ext>
             </a:extLst>
           </p:cNvPr>
@@ -10454,7 +10455,7 @@
             <p:cNvPr id="52" name="Freeform: Shape 51">
               <a:extLst>
                 <a:ext uri="{FF2B5EF4-FFF2-40B4-BE49-F238E27FC236}">
-                  <a16:creationId xmlns:a16="http://schemas.microsoft.com/office/drawing/2014/main" id="{E1A4FD5C-1E5B-46D1-BA9D-99928D19AF04}"/>
+                  <a16:creationId xmlns:a16="http://schemas.microsoft.com/office/drawing/2014/main" xmlns="" id="{E1A4FD5C-1E5B-46D1-BA9D-99928D19AF04}"/>
                 </a:ext>
               </a:extLst>
             </p:cNvPr>
@@ -10594,7 +10595,7 @@
             <p:cNvPr id="53" name="Freeform: Shape 52">
               <a:extLst>
                 <a:ext uri="{FF2B5EF4-FFF2-40B4-BE49-F238E27FC236}">
-                  <a16:creationId xmlns:a16="http://schemas.microsoft.com/office/drawing/2014/main" id="{B7DF0ED5-A971-408F-A055-C7E5D7A623CD}"/>
+                  <a16:creationId xmlns:a16="http://schemas.microsoft.com/office/drawing/2014/main" xmlns="" id="{B7DF0ED5-A971-408F-A055-C7E5D7A623CD}"/>
                 </a:ext>
               </a:extLst>
             </p:cNvPr>
@@ -10736,7 +10737,7 @@
             <p:cNvPr id="54" name="Oval 53">
               <a:extLst>
                 <a:ext uri="{FF2B5EF4-FFF2-40B4-BE49-F238E27FC236}">
-                  <a16:creationId xmlns:a16="http://schemas.microsoft.com/office/drawing/2014/main" id="{AA81F353-4C5B-4A37-9846-2C1E2D0FC25F}"/>
+                  <a16:creationId xmlns:a16="http://schemas.microsoft.com/office/drawing/2014/main" xmlns="" id="{AA81F353-4C5B-4A37-9846-2C1E2D0FC25F}"/>
                 </a:ext>
               </a:extLst>
             </p:cNvPr>
@@ -10805,7 +10806,7 @@
             <p:cNvPr id="55" name="Oval 54">
               <a:extLst>
                 <a:ext uri="{FF2B5EF4-FFF2-40B4-BE49-F238E27FC236}">
-                  <a16:creationId xmlns:a16="http://schemas.microsoft.com/office/drawing/2014/main" id="{42B74EA3-11CE-4D3F-99AD-162563447653}"/>
+                  <a16:creationId xmlns:a16="http://schemas.microsoft.com/office/drawing/2014/main" xmlns="" id="{42B74EA3-11CE-4D3F-99AD-162563447653}"/>
                 </a:ext>
               </a:extLst>
             </p:cNvPr>
@@ -10875,7 +10876,7 @@
           <p:cNvPr id="56" name="Picture Placeholder 55">
             <a:extLst>
               <a:ext uri="{FF2B5EF4-FFF2-40B4-BE49-F238E27FC236}">
-                <a16:creationId xmlns:a16="http://schemas.microsoft.com/office/drawing/2014/main" id="{8F41896B-6DDA-4F82-9F74-3EBF93A3CD58}"/>
+                <a16:creationId xmlns:a16="http://schemas.microsoft.com/office/drawing/2014/main" xmlns="" id="{8F41896B-6DDA-4F82-9F74-3EBF93A3CD58}"/>
               </a:ext>
             </a:extLst>
           </p:cNvPr>
@@ -10913,7 +10914,7 @@
           <p:cNvPr id="57" name="Picture Placeholder 55">
             <a:extLst>
               <a:ext uri="{FF2B5EF4-FFF2-40B4-BE49-F238E27FC236}">
-                <a16:creationId xmlns:a16="http://schemas.microsoft.com/office/drawing/2014/main" id="{EF85499B-C29A-4C8B-922C-7CE4771E352C}"/>
+                <a16:creationId xmlns:a16="http://schemas.microsoft.com/office/drawing/2014/main" xmlns="" id="{EF85499B-C29A-4C8B-922C-7CE4771E352C}"/>
               </a:ext>
             </a:extLst>
           </p:cNvPr>
@@ -10951,7 +10952,7 @@
           <p:cNvPr id="58" name="Picture Placeholder 55">
             <a:extLst>
               <a:ext uri="{FF2B5EF4-FFF2-40B4-BE49-F238E27FC236}">
-                <a16:creationId xmlns:a16="http://schemas.microsoft.com/office/drawing/2014/main" id="{F82A1DB8-0AE7-4E17-B07B-FCF45B85EE17}"/>
+                <a16:creationId xmlns:a16="http://schemas.microsoft.com/office/drawing/2014/main" xmlns="" id="{F82A1DB8-0AE7-4E17-B07B-FCF45B85EE17}"/>
               </a:ext>
             </a:extLst>
           </p:cNvPr>
@@ -10990,7 +10991,7 @@
           <p:cNvPr id="59" name="Picture Placeholder 55">
             <a:extLst>
               <a:ext uri="{FF2B5EF4-FFF2-40B4-BE49-F238E27FC236}">
-                <a16:creationId xmlns:a16="http://schemas.microsoft.com/office/drawing/2014/main" id="{A83EEB6C-83B7-471D-B5A4-4071534048D2}"/>
+                <a16:creationId xmlns:a16="http://schemas.microsoft.com/office/drawing/2014/main" xmlns="" id="{A83EEB6C-83B7-471D-B5A4-4071534048D2}"/>
               </a:ext>
             </a:extLst>
           </p:cNvPr>
@@ -11028,7 +11029,7 @@
           <p:cNvPr id="63" name="Text Placeholder 62">
             <a:extLst>
               <a:ext uri="{FF2B5EF4-FFF2-40B4-BE49-F238E27FC236}">
-                <a16:creationId xmlns:a16="http://schemas.microsoft.com/office/drawing/2014/main" id="{17A96A8C-F792-485A-9BB9-4DEDCA0CE6B8}"/>
+                <a16:creationId xmlns:a16="http://schemas.microsoft.com/office/drawing/2014/main" xmlns="" id="{17A96A8C-F792-485A-9BB9-4DEDCA0CE6B8}"/>
               </a:ext>
             </a:extLst>
           </p:cNvPr>
@@ -11069,7 +11070,7 @@
           <p:cNvPr id="61" name="Text Placeholder 60">
             <a:extLst>
               <a:ext uri="{FF2B5EF4-FFF2-40B4-BE49-F238E27FC236}">
-                <a16:creationId xmlns:a16="http://schemas.microsoft.com/office/drawing/2014/main" id="{6C65AE07-519E-4E3B-8521-621C8343914D}"/>
+                <a16:creationId xmlns:a16="http://schemas.microsoft.com/office/drawing/2014/main" xmlns="" id="{6C65AE07-519E-4E3B-8521-621C8343914D}"/>
               </a:ext>
             </a:extLst>
           </p:cNvPr>
@@ -11110,7 +11111,7 @@
           <p:cNvPr id="65" name="Text Placeholder 62">
             <a:extLst>
               <a:ext uri="{FF2B5EF4-FFF2-40B4-BE49-F238E27FC236}">
-                <a16:creationId xmlns:a16="http://schemas.microsoft.com/office/drawing/2014/main" id="{FB878318-C287-428B-8105-429BC4B03F55}"/>
+                <a16:creationId xmlns:a16="http://schemas.microsoft.com/office/drawing/2014/main" xmlns="" id="{FB878318-C287-428B-8105-429BC4B03F55}"/>
               </a:ext>
             </a:extLst>
           </p:cNvPr>
@@ -11151,7 +11152,7 @@
           <p:cNvPr id="64" name="Text Placeholder 60">
             <a:extLst>
               <a:ext uri="{FF2B5EF4-FFF2-40B4-BE49-F238E27FC236}">
-                <a16:creationId xmlns:a16="http://schemas.microsoft.com/office/drawing/2014/main" id="{1465E516-2CEF-4F9E-9375-7D41DCFCBB41}"/>
+                <a16:creationId xmlns:a16="http://schemas.microsoft.com/office/drawing/2014/main" xmlns="" id="{1465E516-2CEF-4F9E-9375-7D41DCFCBB41}"/>
               </a:ext>
             </a:extLst>
           </p:cNvPr>
@@ -11192,7 +11193,7 @@
           <p:cNvPr id="67" name="Text Placeholder 62">
             <a:extLst>
               <a:ext uri="{FF2B5EF4-FFF2-40B4-BE49-F238E27FC236}">
-                <a16:creationId xmlns:a16="http://schemas.microsoft.com/office/drawing/2014/main" id="{FE012CE3-36AA-4016-A88E-27BCFFEFD69F}"/>
+                <a16:creationId xmlns:a16="http://schemas.microsoft.com/office/drawing/2014/main" xmlns="" id="{FE012CE3-36AA-4016-A88E-27BCFFEFD69F}"/>
               </a:ext>
             </a:extLst>
           </p:cNvPr>
@@ -11233,7 +11234,7 @@
           <p:cNvPr id="66" name="Text Placeholder 60">
             <a:extLst>
               <a:ext uri="{FF2B5EF4-FFF2-40B4-BE49-F238E27FC236}">
-                <a16:creationId xmlns:a16="http://schemas.microsoft.com/office/drawing/2014/main" id="{8D5671AF-0137-4226-8A84-2784817E519C}"/>
+                <a16:creationId xmlns:a16="http://schemas.microsoft.com/office/drawing/2014/main" xmlns="" id="{8D5671AF-0137-4226-8A84-2784817E519C}"/>
               </a:ext>
             </a:extLst>
           </p:cNvPr>
@@ -11274,7 +11275,7 @@
           <p:cNvPr id="69" name="Text Placeholder 62">
             <a:extLst>
               <a:ext uri="{FF2B5EF4-FFF2-40B4-BE49-F238E27FC236}">
-                <a16:creationId xmlns:a16="http://schemas.microsoft.com/office/drawing/2014/main" id="{DA1587F0-23BF-4FB8-B06C-2B0AA928E931}"/>
+                <a16:creationId xmlns:a16="http://schemas.microsoft.com/office/drawing/2014/main" xmlns="" id="{DA1587F0-23BF-4FB8-B06C-2B0AA928E931}"/>
               </a:ext>
             </a:extLst>
           </p:cNvPr>
@@ -11315,7 +11316,7 @@
           <p:cNvPr id="68" name="Text Placeholder 60">
             <a:extLst>
               <a:ext uri="{FF2B5EF4-FFF2-40B4-BE49-F238E27FC236}">
-                <a16:creationId xmlns:a16="http://schemas.microsoft.com/office/drawing/2014/main" id="{565C0B22-B5E7-44BB-A17C-7FB5BB5D82BB}"/>
+                <a16:creationId xmlns:a16="http://schemas.microsoft.com/office/drawing/2014/main" xmlns="" id="{565C0B22-B5E7-44BB-A17C-7FB5BB5D82BB}"/>
               </a:ext>
             </a:extLst>
           </p:cNvPr>
@@ -11356,7 +11357,7 @@
           <p:cNvPr id="4" name="Date Placeholder 3">
             <a:extLst>
               <a:ext uri="{FF2B5EF4-FFF2-40B4-BE49-F238E27FC236}">
-                <a16:creationId xmlns:a16="http://schemas.microsoft.com/office/drawing/2014/main" id="{D8661572-1A59-4E3B-BA65-3329E9468C69}"/>
+                <a16:creationId xmlns:a16="http://schemas.microsoft.com/office/drawing/2014/main" xmlns="" id="{D8661572-1A59-4E3B-BA65-3329E9468C69}"/>
               </a:ext>
             </a:extLst>
           </p:cNvPr>
@@ -11387,7 +11388,7 @@
           <p:cNvPr id="5" name="Footer Placeholder 4">
             <a:extLst>
               <a:ext uri="{FF2B5EF4-FFF2-40B4-BE49-F238E27FC236}">
-                <a16:creationId xmlns:a16="http://schemas.microsoft.com/office/drawing/2014/main" id="{AFEF84F1-99FE-4F0B-9E76-F581C2C1B6D9}"/>
+                <a16:creationId xmlns:a16="http://schemas.microsoft.com/office/drawing/2014/main" xmlns="" id="{AFEF84F1-99FE-4F0B-9E76-F581C2C1B6D9}"/>
               </a:ext>
             </a:extLst>
           </p:cNvPr>
@@ -11417,7 +11418,7 @@
           <p:cNvPr id="6" name="Slide Number Placeholder 5">
             <a:extLst>
               <a:ext uri="{FF2B5EF4-FFF2-40B4-BE49-F238E27FC236}">
-                <a16:creationId xmlns:a16="http://schemas.microsoft.com/office/drawing/2014/main" id="{97B2D769-16B1-43C4-BF14-3175533511ED}"/>
+                <a16:creationId xmlns:a16="http://schemas.microsoft.com/office/drawing/2014/main" xmlns="" id="{97B2D769-16B1-43C4-BF14-3175533511ED}"/>
               </a:ext>
             </a:extLst>
           </p:cNvPr>
@@ -11478,7 +11479,7 @@
           <p:cNvPr id="12" name="Oval 11">
             <a:extLst>
               <a:ext uri="{FF2B5EF4-FFF2-40B4-BE49-F238E27FC236}">
-                <a16:creationId xmlns:a16="http://schemas.microsoft.com/office/drawing/2014/main" id="{FD65A50E-2F73-4426-8586-9731AFA2D2E0}"/>
+                <a16:creationId xmlns:a16="http://schemas.microsoft.com/office/drawing/2014/main" xmlns="" id="{FD65A50E-2F73-4426-8586-9731AFA2D2E0}"/>
               </a:ext>
             </a:extLst>
           </p:cNvPr>
@@ -11561,7 +11562,7 @@
           <p:cNvPr id="11" name="Rectangle 10">
             <a:extLst>
               <a:ext uri="{FF2B5EF4-FFF2-40B4-BE49-F238E27FC236}">
-                <a16:creationId xmlns:a16="http://schemas.microsoft.com/office/drawing/2014/main" id="{EB89C080-4102-49AE-BDA9-59A4A67E2486}"/>
+                <a16:creationId xmlns:a16="http://schemas.microsoft.com/office/drawing/2014/main" xmlns="" id="{EB89C080-4102-49AE-BDA9-59A4A67E2486}"/>
               </a:ext>
             </a:extLst>
           </p:cNvPr>
@@ -11617,7 +11618,7 @@
           <p:cNvPr id="2" name="Title 1">
             <a:extLst>
               <a:ext uri="{FF2B5EF4-FFF2-40B4-BE49-F238E27FC236}">
-                <a16:creationId xmlns:a16="http://schemas.microsoft.com/office/drawing/2014/main" id="{DDE62014-F04C-495A-964E-6B888D49CDE9}"/>
+                <a16:creationId xmlns:a16="http://schemas.microsoft.com/office/drawing/2014/main" xmlns="" id="{DDE62014-F04C-495A-964E-6B888D49CDE9}"/>
               </a:ext>
             </a:extLst>
           </p:cNvPr>
@@ -11662,7 +11663,7 @@
           <p:cNvPr id="3" name="Text Placeholder 2">
             <a:extLst>
               <a:ext uri="{FF2B5EF4-FFF2-40B4-BE49-F238E27FC236}">
-                <a16:creationId xmlns:a16="http://schemas.microsoft.com/office/drawing/2014/main" id="{555DF027-E633-44EE-ACA0-C205930AA93E}"/>
+                <a16:creationId xmlns:a16="http://schemas.microsoft.com/office/drawing/2014/main" xmlns="" id="{555DF027-E633-44EE-ACA0-C205930AA93E}"/>
               </a:ext>
             </a:extLst>
           </p:cNvPr>
@@ -11740,7 +11741,7 @@
           <p:cNvPr id="4" name="Content Placeholder 3">
             <a:extLst>
               <a:ext uri="{FF2B5EF4-FFF2-40B4-BE49-F238E27FC236}">
-                <a16:creationId xmlns:a16="http://schemas.microsoft.com/office/drawing/2014/main" id="{9BA4F363-FEEF-4CD2-A18E-17AE8D485171}"/>
+                <a16:creationId xmlns:a16="http://schemas.microsoft.com/office/drawing/2014/main" xmlns="" id="{9BA4F363-FEEF-4CD2-A18E-17AE8D485171}"/>
               </a:ext>
             </a:extLst>
           </p:cNvPr>
@@ -11821,7 +11822,7 @@
           <p:cNvPr id="5" name="Text Placeholder 4">
             <a:extLst>
               <a:ext uri="{FF2B5EF4-FFF2-40B4-BE49-F238E27FC236}">
-                <a16:creationId xmlns:a16="http://schemas.microsoft.com/office/drawing/2014/main" id="{34E50F8C-4D64-40FD-AE8C-6A1F3C2A84ED}"/>
+                <a16:creationId xmlns:a16="http://schemas.microsoft.com/office/drawing/2014/main" xmlns="" id="{34E50F8C-4D64-40FD-AE8C-6A1F3C2A84ED}"/>
               </a:ext>
             </a:extLst>
           </p:cNvPr>
@@ -11866,7 +11867,7 @@
           <p:cNvPr id="6" name="Content Placeholder 5">
             <a:extLst>
               <a:ext uri="{FF2B5EF4-FFF2-40B4-BE49-F238E27FC236}">
-                <a16:creationId xmlns:a16="http://schemas.microsoft.com/office/drawing/2014/main" id="{A7AC943E-DB2B-40E0-907F-8EA1404791DE}"/>
+                <a16:creationId xmlns:a16="http://schemas.microsoft.com/office/drawing/2014/main" xmlns="" id="{A7AC943E-DB2B-40E0-907F-8EA1404791DE}"/>
               </a:ext>
             </a:extLst>
           </p:cNvPr>
@@ -11946,7 +11947,7 @@
           <p:cNvPr id="7" name="Date Placeholder 6">
             <a:extLst>
               <a:ext uri="{FF2B5EF4-FFF2-40B4-BE49-F238E27FC236}">
-                <a16:creationId xmlns:a16="http://schemas.microsoft.com/office/drawing/2014/main" id="{DDCDCD5B-3F26-4AFA-8BD4-E5D8DD2AF494}"/>
+                <a16:creationId xmlns:a16="http://schemas.microsoft.com/office/drawing/2014/main" xmlns="" id="{DDCDCD5B-3F26-4AFA-8BD4-E5D8DD2AF494}"/>
               </a:ext>
             </a:extLst>
           </p:cNvPr>
@@ -11976,7 +11977,7 @@
           <p:cNvPr id="8" name="Footer Placeholder 7">
             <a:extLst>
               <a:ext uri="{FF2B5EF4-FFF2-40B4-BE49-F238E27FC236}">
-                <a16:creationId xmlns:a16="http://schemas.microsoft.com/office/drawing/2014/main" id="{3D10D1EE-83A0-4FB5-9B25-8A73DE891A87}"/>
+                <a16:creationId xmlns:a16="http://schemas.microsoft.com/office/drawing/2014/main" xmlns="" id="{3D10D1EE-83A0-4FB5-9B25-8A73DE891A87}"/>
               </a:ext>
             </a:extLst>
           </p:cNvPr>
@@ -12006,7 +12007,7 @@
           <p:cNvPr id="9" name="Slide Number Placeholder 8">
             <a:extLst>
               <a:ext uri="{FF2B5EF4-FFF2-40B4-BE49-F238E27FC236}">
-                <a16:creationId xmlns:a16="http://schemas.microsoft.com/office/drawing/2014/main" id="{03031C35-2E5B-491D-85ED-DB42A4FE1623}"/>
+                <a16:creationId xmlns:a16="http://schemas.microsoft.com/office/drawing/2014/main" xmlns="" id="{03031C35-2E5B-491D-85ED-DB42A4FE1623}"/>
               </a:ext>
             </a:extLst>
           </p:cNvPr>
@@ -12072,7 +12073,7 @@
           <p:cNvPr id="2" name="Title Placeholder 1">
             <a:extLst>
               <a:ext uri="{FF2B5EF4-FFF2-40B4-BE49-F238E27FC236}">
-                <a16:creationId xmlns:a16="http://schemas.microsoft.com/office/drawing/2014/main" id="{A8028302-E866-455D-8898-53623027543F}"/>
+                <a16:creationId xmlns:a16="http://schemas.microsoft.com/office/drawing/2014/main" xmlns="" id="{A8028302-E866-455D-8898-53623027543F}"/>
               </a:ext>
             </a:extLst>
           </p:cNvPr>
@@ -12116,7 +12117,7 @@
           <p:cNvPr id="3" name="Text Placeholder 2">
             <a:extLst>
               <a:ext uri="{FF2B5EF4-FFF2-40B4-BE49-F238E27FC236}">
-                <a16:creationId xmlns:a16="http://schemas.microsoft.com/office/drawing/2014/main" id="{BC94E72B-F0CF-4BC4-B509-A1C4508BE435}"/>
+                <a16:creationId xmlns:a16="http://schemas.microsoft.com/office/drawing/2014/main" xmlns="" id="{BC94E72B-F0CF-4BC4-B509-A1C4508BE435}"/>
               </a:ext>
             </a:extLst>
           </p:cNvPr>
@@ -12184,7 +12185,7 @@
           <p:cNvPr id="4" name="Date Placeholder 3">
             <a:extLst>
               <a:ext uri="{FF2B5EF4-FFF2-40B4-BE49-F238E27FC236}">
-                <a16:creationId xmlns:a16="http://schemas.microsoft.com/office/drawing/2014/main" id="{34ACE49D-C22F-4540-AC09-E421D2A2EDBE}"/>
+                <a16:creationId xmlns:a16="http://schemas.microsoft.com/office/drawing/2014/main" xmlns="" id="{34ACE49D-C22F-4540-AC09-E421D2A2EDBE}"/>
               </a:ext>
             </a:extLst>
           </p:cNvPr>
@@ -12234,7 +12235,7 @@
           <p:cNvPr id="5" name="Footer Placeholder 4">
             <a:extLst>
               <a:ext uri="{FF2B5EF4-FFF2-40B4-BE49-F238E27FC236}">
-                <a16:creationId xmlns:a16="http://schemas.microsoft.com/office/drawing/2014/main" id="{ACD5C3BE-317E-49E8-82B5-C8A7EC9C8A7E}"/>
+                <a16:creationId xmlns:a16="http://schemas.microsoft.com/office/drawing/2014/main" xmlns="" id="{ACD5C3BE-317E-49E8-82B5-C8A7EC9C8A7E}"/>
               </a:ext>
             </a:extLst>
           </p:cNvPr>
@@ -12284,7 +12285,7 @@
           <p:cNvPr id="6" name="Slide Number Placeholder 5">
             <a:extLst>
               <a:ext uri="{FF2B5EF4-FFF2-40B4-BE49-F238E27FC236}">
-                <a16:creationId xmlns:a16="http://schemas.microsoft.com/office/drawing/2014/main" id="{45574E12-6C16-431F-B2CE-E4B15916BA05}"/>
+                <a16:creationId xmlns:a16="http://schemas.microsoft.com/office/drawing/2014/main" xmlns="" id="{45574E12-6C16-431F-B2CE-E4B15916BA05}"/>
               </a:ext>
             </a:extLst>
           </p:cNvPr>
@@ -12888,7 +12889,7 @@
           <p:cNvPr id="2" name="Title 1">
             <a:extLst>
               <a:ext uri="{FF2B5EF4-FFF2-40B4-BE49-F238E27FC236}">
-                <a16:creationId xmlns:a16="http://schemas.microsoft.com/office/drawing/2014/main" id="{286E938C-9D94-4B05-979A-D39FFC457291}"/>
+                <a16:creationId xmlns:a16="http://schemas.microsoft.com/office/drawing/2014/main" xmlns="" id="{286E938C-9D94-4B05-979A-D39FFC457291}"/>
               </a:ext>
             </a:extLst>
           </p:cNvPr>
@@ -12923,7 +12924,7 @@
           <p:cNvPr id="14" name="Picture Placeholder 13" descr="Data Points Digital background">
             <a:extLst>
               <a:ext uri="{FF2B5EF4-FFF2-40B4-BE49-F238E27FC236}">
-                <a16:creationId xmlns:a16="http://schemas.microsoft.com/office/drawing/2014/main" id="{9A8AD548-922D-4E1D-B19C-5F6E808B8160}"/>
+                <a16:creationId xmlns:a16="http://schemas.microsoft.com/office/drawing/2014/main" xmlns="" id="{9A8AD548-922D-4E1D-B19C-5F6E808B8160}"/>
               </a:ext>
             </a:extLst>
           </p:cNvPr>
@@ -12957,7 +12958,7 @@
           <p:cNvPr id="3" name="Subtitle 2">
             <a:extLst>
               <a:ext uri="{FF2B5EF4-FFF2-40B4-BE49-F238E27FC236}">
-                <a16:creationId xmlns:a16="http://schemas.microsoft.com/office/drawing/2014/main" id="{D9A11267-FC52-4990-8D98-010AFABA5544}"/>
+                <a16:creationId xmlns:a16="http://schemas.microsoft.com/office/drawing/2014/main" xmlns="" id="{D9A11267-FC52-4990-8D98-010AFABA5544}"/>
               </a:ext>
             </a:extLst>
           </p:cNvPr>
@@ -13063,7 +13064,7 @@
           <p:cNvPr id="2" name="Title 1">
             <a:extLst>
               <a:ext uri="{FF2B5EF4-FFF2-40B4-BE49-F238E27FC236}">
-                <a16:creationId xmlns:a16="http://schemas.microsoft.com/office/drawing/2014/main" id="{0046426E-F6F6-4A7C-9181-8C3090996261}"/>
+                <a16:creationId xmlns:a16="http://schemas.microsoft.com/office/drawing/2014/main" xmlns="" id="{0046426E-F6F6-4A7C-9181-8C3090996261}"/>
               </a:ext>
             </a:extLst>
           </p:cNvPr>
@@ -13096,7 +13097,7 @@
           <p:cNvPr id="3" name="Content Placeholder 2">
             <a:extLst>
               <a:ext uri="{FF2B5EF4-FFF2-40B4-BE49-F238E27FC236}">
-                <a16:creationId xmlns:a16="http://schemas.microsoft.com/office/drawing/2014/main" id="{D3B60D6F-4D0F-4D33-B2A7-159C8583FF00}"/>
+                <a16:creationId xmlns:a16="http://schemas.microsoft.com/office/drawing/2014/main" xmlns="" id="{D3B60D6F-4D0F-4D33-B2A7-159C8583FF00}"/>
               </a:ext>
             </a:extLst>
           </p:cNvPr>
@@ -13147,7 +13148,7 @@
           <p:cNvPr id="8" name="Picture Placeholder 7" descr="Digital Data">
             <a:extLst>
               <a:ext uri="{FF2B5EF4-FFF2-40B4-BE49-F238E27FC236}">
-                <a16:creationId xmlns:a16="http://schemas.microsoft.com/office/drawing/2014/main" id="{06D2324F-3B7B-45EF-9584-C8EADD2C8C0B}"/>
+                <a16:creationId xmlns:a16="http://schemas.microsoft.com/office/drawing/2014/main" xmlns="" id="{06D2324F-3B7B-45EF-9584-C8EADD2C8C0B}"/>
               </a:ext>
             </a:extLst>
           </p:cNvPr>
@@ -13181,7 +13182,7 @@
           <p:cNvPr id="10" name="Picture Placeholder 9" descr="Data Points ">
             <a:extLst>
               <a:ext uri="{FF2B5EF4-FFF2-40B4-BE49-F238E27FC236}">
-                <a16:creationId xmlns:a16="http://schemas.microsoft.com/office/drawing/2014/main" id="{71F862F9-0E8A-4DB9-8083-1C3AA6E5D777}"/>
+                <a16:creationId xmlns:a16="http://schemas.microsoft.com/office/drawing/2014/main" xmlns="" id="{71F862F9-0E8A-4DB9-8083-1C3AA6E5D777}"/>
               </a:ext>
             </a:extLst>
           </p:cNvPr>
@@ -13215,7 +13216,7 @@
           <p:cNvPr id="12" name="Picture Placeholder 11" descr="Data Background">
             <a:extLst>
               <a:ext uri="{FF2B5EF4-FFF2-40B4-BE49-F238E27FC236}">
-                <a16:creationId xmlns:a16="http://schemas.microsoft.com/office/drawing/2014/main" id="{A63F39B9-0715-40B5-8ECB-9B983F99C690}"/>
+                <a16:creationId xmlns:a16="http://schemas.microsoft.com/office/drawing/2014/main" xmlns="" id="{A63F39B9-0715-40B5-8ECB-9B983F99C690}"/>
               </a:ext>
             </a:extLst>
           </p:cNvPr>
@@ -13249,7 +13250,7 @@
           <p:cNvPr id="13" name="Date Placeholder 12">
             <a:extLst>
               <a:ext uri="{FF2B5EF4-FFF2-40B4-BE49-F238E27FC236}">
-                <a16:creationId xmlns:a16="http://schemas.microsoft.com/office/drawing/2014/main" id="{915FE2C5-E66A-4405-B19E-2C5C546C98E4}"/>
+                <a16:creationId xmlns:a16="http://schemas.microsoft.com/office/drawing/2014/main" xmlns="" id="{915FE2C5-E66A-4405-B19E-2C5C546C98E4}"/>
               </a:ext>
             </a:extLst>
           </p:cNvPr>
@@ -13282,7 +13283,7 @@
           <p:cNvPr id="15" name="Slide Number Placeholder 14">
             <a:extLst>
               <a:ext uri="{FF2B5EF4-FFF2-40B4-BE49-F238E27FC236}">
-                <a16:creationId xmlns:a16="http://schemas.microsoft.com/office/drawing/2014/main" id="{3B199C97-F175-437D-8311-DB662925C063}"/>
+                <a16:creationId xmlns:a16="http://schemas.microsoft.com/office/drawing/2014/main" xmlns="" id="{3B199C97-F175-437D-8311-DB662925C063}"/>
               </a:ext>
             </a:extLst>
           </p:cNvPr>
@@ -13347,7 +13348,7 @@
           <p:cNvPr id="11" name="Title 10">
             <a:extLst>
               <a:ext uri="{FF2B5EF4-FFF2-40B4-BE49-F238E27FC236}">
-                <a16:creationId xmlns:a16="http://schemas.microsoft.com/office/drawing/2014/main" id="{23418ADF-358F-4647-A511-FCFFEDA83429}"/>
+                <a16:creationId xmlns:a16="http://schemas.microsoft.com/office/drawing/2014/main" xmlns="" id="{23418ADF-358F-4647-A511-FCFFEDA83429}"/>
               </a:ext>
             </a:extLst>
           </p:cNvPr>
@@ -13380,7 +13381,7 @@
           <p:cNvPr id="18" name="Picture Placeholder 17" descr="A group of people sitting at a table">
             <a:extLst>
               <a:ext uri="{FF2B5EF4-FFF2-40B4-BE49-F238E27FC236}">
-                <a16:creationId xmlns:a16="http://schemas.microsoft.com/office/drawing/2014/main" id="{E2536017-F539-430C-A901-70AB81CA612A}"/>
+                <a16:creationId xmlns:a16="http://schemas.microsoft.com/office/drawing/2014/main" xmlns="" id="{E2536017-F539-430C-A901-70AB81CA612A}"/>
               </a:ext>
             </a:extLst>
           </p:cNvPr>
@@ -13414,7 +13415,7 @@
           <p:cNvPr id="20" name="Picture Placeholder 19" descr="Data Points Digital background">
             <a:extLst>
               <a:ext uri="{FF2B5EF4-FFF2-40B4-BE49-F238E27FC236}">
-                <a16:creationId xmlns:a16="http://schemas.microsoft.com/office/drawing/2014/main" id="{528A7D8D-1AB5-46C4-93FA-D92C2FD51692}"/>
+                <a16:creationId xmlns:a16="http://schemas.microsoft.com/office/drawing/2014/main" xmlns="" id="{528A7D8D-1AB5-46C4-93FA-D92C2FD51692}"/>
               </a:ext>
             </a:extLst>
           </p:cNvPr>
@@ -13448,7 +13449,7 @@
           <p:cNvPr id="25" name="Picture Placeholder 24" descr="Digital Graph Screen">
             <a:extLst>
               <a:ext uri="{FF2B5EF4-FFF2-40B4-BE49-F238E27FC236}">
-                <a16:creationId xmlns:a16="http://schemas.microsoft.com/office/drawing/2014/main" id="{B7353C46-ACC1-4078-85C2-26B57B0E58B7}"/>
+                <a16:creationId xmlns:a16="http://schemas.microsoft.com/office/drawing/2014/main" xmlns="" id="{B7353C46-ACC1-4078-85C2-26B57B0E58B7}"/>
               </a:ext>
             </a:extLst>
           </p:cNvPr>
@@ -13482,7 +13483,7 @@
           <p:cNvPr id="4" name="Date Placeholder 3">
             <a:extLst>
               <a:ext uri="{FF2B5EF4-FFF2-40B4-BE49-F238E27FC236}">
-                <a16:creationId xmlns:a16="http://schemas.microsoft.com/office/drawing/2014/main" id="{0C329F70-04F7-4C70-BCF8-D4371F54EF2F}"/>
+                <a16:creationId xmlns:a16="http://schemas.microsoft.com/office/drawing/2014/main" xmlns="" id="{0C329F70-04F7-4C70-BCF8-D4371F54EF2F}"/>
               </a:ext>
             </a:extLst>
           </p:cNvPr>
@@ -13516,7 +13517,7 @@
           <p:cNvPr id="6" name="Slide Number Placeholder 5">
             <a:extLst>
               <a:ext uri="{FF2B5EF4-FFF2-40B4-BE49-F238E27FC236}">
-                <a16:creationId xmlns:a16="http://schemas.microsoft.com/office/drawing/2014/main" id="{9ED907F8-C614-4D59-A03F-BF9CD5E35703}"/>
+                <a16:creationId xmlns:a16="http://schemas.microsoft.com/office/drawing/2014/main" xmlns="" id="{9ED907F8-C614-4D59-A03F-BF9CD5E35703}"/>
               </a:ext>
             </a:extLst>
           </p:cNvPr>
@@ -13551,7 +13552,7 @@
           <p:cNvPr id="23" name="Picture Placeholder 22" descr="A person drawing on a white board">
             <a:extLst>
               <a:ext uri="{FF2B5EF4-FFF2-40B4-BE49-F238E27FC236}">
-                <a16:creationId xmlns:a16="http://schemas.microsoft.com/office/drawing/2014/main" id="{2B3C4F95-A0FA-45D9-BF43-1C398F65B891}"/>
+                <a16:creationId xmlns:a16="http://schemas.microsoft.com/office/drawing/2014/main" xmlns="" id="{2B3C4F95-A0FA-45D9-BF43-1C398F65B891}"/>
               </a:ext>
             </a:extLst>
           </p:cNvPr>
@@ -13585,7 +13586,7 @@
           <p:cNvPr id="12" name="Content Placeholder 11">
             <a:extLst>
               <a:ext uri="{FF2B5EF4-FFF2-40B4-BE49-F238E27FC236}">
-                <a16:creationId xmlns:a16="http://schemas.microsoft.com/office/drawing/2014/main" id="{E5127060-CDBF-435F-9009-A5451CCE305D}"/>
+                <a16:creationId xmlns:a16="http://schemas.microsoft.com/office/drawing/2014/main" xmlns="" id="{E5127060-CDBF-435F-9009-A5451CCE305D}"/>
               </a:ext>
             </a:extLst>
           </p:cNvPr>
@@ -13663,7 +13664,7 @@
           <p:cNvPr id="7" name="Title 6">
             <a:extLst>
               <a:ext uri="{FF2B5EF4-FFF2-40B4-BE49-F238E27FC236}">
-                <a16:creationId xmlns:a16="http://schemas.microsoft.com/office/drawing/2014/main" id="{3E174092-82D3-44E0-8948-4096232ED0A7}"/>
+                <a16:creationId xmlns:a16="http://schemas.microsoft.com/office/drawing/2014/main" xmlns="" id="{3E174092-82D3-44E0-8948-4096232ED0A7}"/>
               </a:ext>
             </a:extLst>
           </p:cNvPr>
@@ -13696,7 +13697,7 @@
           <p:cNvPr id="4" name="Date Placeholder 3">
             <a:extLst>
               <a:ext uri="{FF2B5EF4-FFF2-40B4-BE49-F238E27FC236}">
-                <a16:creationId xmlns:a16="http://schemas.microsoft.com/office/drawing/2014/main" id="{E39EF484-38C8-4EDC-ACF5-695CFB216839}"/>
+                <a16:creationId xmlns:a16="http://schemas.microsoft.com/office/drawing/2014/main" xmlns="" id="{E39EF484-38C8-4EDC-ACF5-695CFB216839}"/>
               </a:ext>
             </a:extLst>
           </p:cNvPr>
@@ -13730,7 +13731,7 @@
           <p:cNvPr id="5" name="Footer Placeholder 4">
             <a:extLst>
               <a:ext uri="{FF2B5EF4-FFF2-40B4-BE49-F238E27FC236}">
-                <a16:creationId xmlns:a16="http://schemas.microsoft.com/office/drawing/2014/main" id="{AFD183D7-B16E-4A9D-BC4B-D1EC347BF97E}"/>
+                <a16:creationId xmlns:a16="http://schemas.microsoft.com/office/drawing/2014/main" xmlns="" id="{AFD183D7-B16E-4A9D-BC4B-D1EC347BF97E}"/>
               </a:ext>
             </a:extLst>
           </p:cNvPr>
@@ -13763,7 +13764,7 @@
           <p:cNvPr id="6" name="Slide Number Placeholder 5">
             <a:extLst>
               <a:ext uri="{FF2B5EF4-FFF2-40B4-BE49-F238E27FC236}">
-                <a16:creationId xmlns:a16="http://schemas.microsoft.com/office/drawing/2014/main" id="{705C33DF-36C9-49E9-B48D-A320B179C4D4}"/>
+                <a16:creationId xmlns:a16="http://schemas.microsoft.com/office/drawing/2014/main" xmlns="" id="{705C33DF-36C9-49E9-B48D-A320B179C4D4}"/>
               </a:ext>
             </a:extLst>
           </p:cNvPr>
@@ -13798,7 +13799,7 @@
           <p:cNvPr id="3" name="Content Placeholder 2">
             <a:extLst>
               <a:ext uri="{FF2B5EF4-FFF2-40B4-BE49-F238E27FC236}">
-                <a16:creationId xmlns:a16="http://schemas.microsoft.com/office/drawing/2014/main" id="{6C1EF5D3-0F11-F10A-BCE9-7E504CA7C497}"/>
+                <a16:creationId xmlns:a16="http://schemas.microsoft.com/office/drawing/2014/main" xmlns="" id="{6C1EF5D3-0F11-F10A-BCE9-7E504CA7C497}"/>
               </a:ext>
             </a:extLst>
           </p:cNvPr>
@@ -13893,7 +13894,7 @@
           <p:cNvPr id="9" name="Picture 8">
             <a:extLst>
               <a:ext uri="{FF2B5EF4-FFF2-40B4-BE49-F238E27FC236}">
-                <a16:creationId xmlns:a16="http://schemas.microsoft.com/office/drawing/2014/main" id="{BB65090E-BF97-E709-9738-1E7A4F9586D3}"/>
+                <a16:creationId xmlns:a16="http://schemas.microsoft.com/office/drawing/2014/main" xmlns="" id="{BB65090E-BF97-E709-9738-1E7A4F9586D3}"/>
               </a:ext>
             </a:extLst>
           </p:cNvPr>
@@ -13953,7 +13954,7 @@
           <p:cNvPr id="7" name="Title 6">
             <a:extLst>
               <a:ext uri="{FF2B5EF4-FFF2-40B4-BE49-F238E27FC236}">
-                <a16:creationId xmlns:a16="http://schemas.microsoft.com/office/drawing/2014/main" id="{3E174092-82D3-44E0-8948-4096232ED0A7}"/>
+                <a16:creationId xmlns:a16="http://schemas.microsoft.com/office/drawing/2014/main" xmlns="" id="{3E174092-82D3-44E0-8948-4096232ED0A7}"/>
               </a:ext>
             </a:extLst>
           </p:cNvPr>
@@ -13986,7 +13987,7 @@
           <p:cNvPr id="4" name="Date Placeholder 3">
             <a:extLst>
               <a:ext uri="{FF2B5EF4-FFF2-40B4-BE49-F238E27FC236}">
-                <a16:creationId xmlns:a16="http://schemas.microsoft.com/office/drawing/2014/main" id="{E39EF484-38C8-4EDC-ACF5-695CFB216839}"/>
+                <a16:creationId xmlns:a16="http://schemas.microsoft.com/office/drawing/2014/main" xmlns="" id="{E39EF484-38C8-4EDC-ACF5-695CFB216839}"/>
               </a:ext>
             </a:extLst>
           </p:cNvPr>
@@ -14020,7 +14021,7 @@
           <p:cNvPr id="5" name="Footer Placeholder 4">
             <a:extLst>
               <a:ext uri="{FF2B5EF4-FFF2-40B4-BE49-F238E27FC236}">
-                <a16:creationId xmlns:a16="http://schemas.microsoft.com/office/drawing/2014/main" id="{AFD183D7-B16E-4A9D-BC4B-D1EC347BF97E}"/>
+                <a16:creationId xmlns:a16="http://schemas.microsoft.com/office/drawing/2014/main" xmlns="" id="{AFD183D7-B16E-4A9D-BC4B-D1EC347BF97E}"/>
               </a:ext>
             </a:extLst>
           </p:cNvPr>
@@ -14053,7 +14054,7 @@
           <p:cNvPr id="6" name="Slide Number Placeholder 5">
             <a:extLst>
               <a:ext uri="{FF2B5EF4-FFF2-40B4-BE49-F238E27FC236}">
-                <a16:creationId xmlns:a16="http://schemas.microsoft.com/office/drawing/2014/main" id="{705C33DF-36C9-49E9-B48D-A320B179C4D4}"/>
+                <a16:creationId xmlns:a16="http://schemas.microsoft.com/office/drawing/2014/main" xmlns="" id="{705C33DF-36C9-49E9-B48D-A320B179C4D4}"/>
               </a:ext>
             </a:extLst>
           </p:cNvPr>
@@ -14088,7 +14089,7 @@
           <p:cNvPr id="3" name="Content Placeholder 2">
             <a:extLst>
               <a:ext uri="{FF2B5EF4-FFF2-40B4-BE49-F238E27FC236}">
-                <a16:creationId xmlns:a16="http://schemas.microsoft.com/office/drawing/2014/main" id="{6C1EF5D3-0F11-F10A-BCE9-7E504CA7C497}"/>
+                <a16:creationId xmlns:a16="http://schemas.microsoft.com/office/drawing/2014/main" xmlns="" id="{6C1EF5D3-0F11-F10A-BCE9-7E504CA7C497}"/>
               </a:ext>
             </a:extLst>
           </p:cNvPr>
@@ -14221,7 +14222,7 @@
           <p:cNvPr id="2" name="Title 1">
             <a:extLst>
               <a:ext uri="{FF2B5EF4-FFF2-40B4-BE49-F238E27FC236}">
-                <a16:creationId xmlns:a16="http://schemas.microsoft.com/office/drawing/2014/main" id="{FCB102D8-1D22-4940-AF19-07CF3A0DC5F4}"/>
+                <a16:creationId xmlns:a16="http://schemas.microsoft.com/office/drawing/2014/main" xmlns="" id="{FCB102D8-1D22-4940-AF19-07CF3A0DC5F4}"/>
               </a:ext>
             </a:extLst>
           </p:cNvPr>
@@ -14254,7 +14255,7 @@
           <p:cNvPr id="14" name="Date Placeholder 13">
             <a:extLst>
               <a:ext uri="{FF2B5EF4-FFF2-40B4-BE49-F238E27FC236}">
-                <a16:creationId xmlns:a16="http://schemas.microsoft.com/office/drawing/2014/main" id="{DC738669-5750-45EA-9715-A0041D4C569B}"/>
+                <a16:creationId xmlns:a16="http://schemas.microsoft.com/office/drawing/2014/main" xmlns="" id="{DC738669-5750-45EA-9715-A0041D4C569B}"/>
               </a:ext>
             </a:extLst>
           </p:cNvPr>
@@ -14287,7 +14288,7 @@
           <p:cNvPr id="15" name="Footer Placeholder 14">
             <a:extLst>
               <a:ext uri="{FF2B5EF4-FFF2-40B4-BE49-F238E27FC236}">
-                <a16:creationId xmlns:a16="http://schemas.microsoft.com/office/drawing/2014/main" id="{CD05A243-8080-4F6D-8538-65CDDF891BA6}"/>
+                <a16:creationId xmlns:a16="http://schemas.microsoft.com/office/drawing/2014/main" xmlns="" id="{CD05A243-8080-4F6D-8538-65CDDF891BA6}"/>
               </a:ext>
             </a:extLst>
           </p:cNvPr>
@@ -14320,7 +14321,7 @@
           <p:cNvPr id="16" name="Slide Number Placeholder 15">
             <a:extLst>
               <a:ext uri="{FF2B5EF4-FFF2-40B4-BE49-F238E27FC236}">
-                <a16:creationId xmlns:a16="http://schemas.microsoft.com/office/drawing/2014/main" id="{3F8A62C8-5437-4C47-AC0F-0605F84CBA57}"/>
+                <a16:creationId xmlns:a16="http://schemas.microsoft.com/office/drawing/2014/main" xmlns="" id="{3F8A62C8-5437-4C47-AC0F-0605F84CBA57}"/>
               </a:ext>
             </a:extLst>
           </p:cNvPr>
@@ -14355,7 +14356,7 @@
           <p:cNvPr id="4" name="Content Placeholder 3">
             <a:extLst>
               <a:ext uri="{FF2B5EF4-FFF2-40B4-BE49-F238E27FC236}">
-                <a16:creationId xmlns:a16="http://schemas.microsoft.com/office/drawing/2014/main" id="{51931B04-A0C8-CEE1-4CFC-B6B89C11027A}"/>
+                <a16:creationId xmlns:a16="http://schemas.microsoft.com/office/drawing/2014/main" xmlns="" id="{51931B04-A0C8-CEE1-4CFC-B6B89C11027A}"/>
               </a:ext>
             </a:extLst>
           </p:cNvPr>
@@ -14406,6 +14407,13 @@
   <p:clrMapOvr>
     <a:masterClrMapping/>
   </p:clrMapOvr>
+  <p:timing>
+    <p:tnLst>
+      <p:par>
+        <p:cTn id="1" dur="indefinite" restart="never" nodeType="tmRoot"/>
+      </p:par>
+    </p:tnLst>
+  </p:timing>
 </p:sld>
 </file>
 
@@ -14431,7 +14439,7 @@
           <p:cNvPr id="2" name="Title 1">
             <a:extLst>
               <a:ext uri="{FF2B5EF4-FFF2-40B4-BE49-F238E27FC236}">
-                <a16:creationId xmlns:a16="http://schemas.microsoft.com/office/drawing/2014/main" id="{FCB102D8-1D22-4940-AF19-07CF3A0DC5F4}"/>
+                <a16:creationId xmlns:a16="http://schemas.microsoft.com/office/drawing/2014/main" xmlns="" id="{FCB102D8-1D22-4940-AF19-07CF3A0DC5F4}"/>
               </a:ext>
             </a:extLst>
           </p:cNvPr>
@@ -14444,8 +14452,8 @@
         </p:nvSpPr>
         <p:spPr>
           <a:xfrm>
-            <a:off x="550862" y="549275"/>
-            <a:ext cx="11091600" cy="1332000"/>
+            <a:off x="559101" y="156536"/>
+            <a:ext cx="11082036" cy="873194"/>
           </a:xfrm>
         </p:spPr>
         <p:txBody>
@@ -14454,8 +14462,9 @@
           <a:p>
             <a:r>
               <a:rPr lang="en-US" dirty="0"/>
-              <a:t>Next Steps</a:t>
-            </a:r>
+              <a:t>Responding to a Survey</a:t>
+            </a:r>
+            <a:endParaRPr lang="en-US" dirty="0"/>
           </a:p>
         </p:txBody>
       </p:sp>
@@ -14464,7 +14473,7 @@
           <p:cNvPr id="14" name="Date Placeholder 13">
             <a:extLst>
               <a:ext uri="{FF2B5EF4-FFF2-40B4-BE49-F238E27FC236}">
-                <a16:creationId xmlns:a16="http://schemas.microsoft.com/office/drawing/2014/main" id="{DC738669-5750-45EA-9715-A0041D4C569B}"/>
+                <a16:creationId xmlns:a16="http://schemas.microsoft.com/office/drawing/2014/main" xmlns="" id="{DC738669-5750-45EA-9715-A0041D4C569B}"/>
               </a:ext>
             </a:extLst>
           </p:cNvPr>
@@ -14486,9 +14495,18 @@
           <a:lstStyle/>
           <a:p>
             <a:r>
-              <a:rPr lang="en-US"/>
-              <a:t>Tuesday, February 2, 20XX</a:t>
-            </a:r>
+              <a:rPr lang="en-US" dirty="0" smtClean="0"/>
+              <a:t>Wednesday, August </a:t>
+            </a:r>
+            <a:r>
+              <a:rPr lang="en-US" dirty="0"/>
+              <a:t>9</a:t>
+            </a:r>
+            <a:r>
+              <a:rPr lang="en-US" dirty="0" smtClean="0"/>
+              <a:t>, 2023</a:t>
+            </a:r>
+            <a:endParaRPr lang="en-US" dirty="0"/>
           </a:p>
         </p:txBody>
       </p:sp>
@@ -14497,7 +14515,7 @@
           <p:cNvPr id="15" name="Footer Placeholder 14">
             <a:extLst>
               <a:ext uri="{FF2B5EF4-FFF2-40B4-BE49-F238E27FC236}">
-                <a16:creationId xmlns:a16="http://schemas.microsoft.com/office/drawing/2014/main" id="{CD05A243-8080-4F6D-8538-65CDDF891BA6}"/>
+                <a16:creationId xmlns:a16="http://schemas.microsoft.com/office/drawing/2014/main" xmlns="" id="{CD05A243-8080-4F6D-8538-65CDDF891BA6}"/>
               </a:ext>
             </a:extLst>
           </p:cNvPr>
@@ -14530,7 +14548,7 @@
           <p:cNvPr id="16" name="Slide Number Placeholder 15">
             <a:extLst>
               <a:ext uri="{FF2B5EF4-FFF2-40B4-BE49-F238E27FC236}">
-                <a16:creationId xmlns:a16="http://schemas.microsoft.com/office/drawing/2014/main" id="{3F8A62C8-5437-4C47-AC0F-0605F84CBA57}"/>
+                <a16:creationId xmlns:a16="http://schemas.microsoft.com/office/drawing/2014/main" xmlns="" id="{3F8A62C8-5437-4C47-AC0F-0605F84CBA57}"/>
               </a:ext>
             </a:extLst>
           </p:cNvPr>
@@ -14565,7 +14583,7 @@
           <p:cNvPr id="4" name="Content Placeholder 3">
             <a:extLst>
               <a:ext uri="{FF2B5EF4-FFF2-40B4-BE49-F238E27FC236}">
-                <a16:creationId xmlns:a16="http://schemas.microsoft.com/office/drawing/2014/main" id="{51931B04-A0C8-CEE1-4CFC-B6B89C11027A}"/>
+                <a16:creationId xmlns:a16="http://schemas.microsoft.com/office/drawing/2014/main" xmlns="" id="{51931B04-A0C8-CEE1-4CFC-B6B89C11027A}"/>
               </a:ext>
             </a:extLst>
           </p:cNvPr>
@@ -14576,49 +14594,154 @@
             <p:ph idx="1"/>
           </p:nvPr>
         </p:nvSpPr>
-        <p:spPr/>
+        <p:spPr>
+          <a:xfrm>
+            <a:off x="550863" y="1087396"/>
+            <a:ext cx="11090274" cy="4967416"/>
+          </a:xfrm>
+        </p:spPr>
         <p:txBody>
           <a:bodyPr/>
           <a:lstStyle/>
           <a:p>
+            <a:endParaRPr lang="en-US" dirty="0"/>
+          </a:p>
+          <a:p>
+            <a:r>
+              <a:rPr lang="en-US" dirty="0" smtClean="0"/>
+              <a:t>Responses </a:t>
+            </a:r>
             <a:r>
               <a:rPr lang="en-US" dirty="0"/>
-              <a:t>Implement features</a:t>
-            </a:r>
-          </a:p>
-          <a:p>
-            <a:pPr lvl="1"/>
+              <a:t>were generated using random choice selections using </a:t>
+            </a:r>
+            <a:r>
+              <a:rPr lang="en-US" dirty="0" smtClean="0"/>
+              <a:t>local </a:t>
+            </a:r>
             <a:r>
               <a:rPr lang="en-US" dirty="0"/>
-              <a:t>Not more than one survey response per address</a:t>
-            </a:r>
-          </a:p>
-          <a:p>
-            <a:pPr lvl="1"/>
+              <a:t>Ganache Accounts</a:t>
+            </a:r>
+          </a:p>
+          <a:p>
+            <a:r>
+              <a:rPr lang="en-US" dirty="0" smtClean="0"/>
+              <a:t> Python function mimics blockchain users </a:t>
+            </a:r>
             <a:r>
               <a:rPr lang="en-US" dirty="0"/>
-              <a:t>A way to authenticate that the responder is a human</a:t>
-            </a:r>
-          </a:p>
-          <a:p>
-            <a:pPr lvl="1"/>
+              <a:t>responding to the </a:t>
+            </a:r>
+            <a:r>
+              <a:rPr lang="en-US" dirty="0" smtClean="0"/>
+              <a:t>survey</a:t>
+            </a:r>
+          </a:p>
+          <a:p>
+            <a:r>
+              <a:rPr lang="en-US" dirty="0" smtClean="0"/>
+              <a:t>Generates </a:t>
+            </a:r>
             <a:r>
               <a:rPr lang="en-US" dirty="0"/>
-              <a:t>Publish results only after the survey timeline expired</a:t>
-            </a:r>
-          </a:p>
-        </p:txBody>
-      </p:sp>
+              <a:t>4 random choices from a list - A, B, C or </a:t>
+            </a:r>
+            <a:r>
+              <a:rPr lang="en-US" dirty="0" smtClean="0"/>
+              <a:t>D</a:t>
+            </a:r>
+          </a:p>
+          <a:p>
+            <a:endParaRPr lang="en-US" dirty="0"/>
+          </a:p>
+          <a:p>
+            <a:endParaRPr lang="en-US" dirty="0" smtClean="0"/>
+          </a:p>
+          <a:p>
+            <a:r>
+              <a:rPr lang="en-US" dirty="0" smtClean="0"/>
+              <a:t>Responses are stored in the smart contract </a:t>
+            </a:r>
+          </a:p>
+          <a:p>
+            <a:pPr marL="0" indent="0">
+              <a:buNone/>
+            </a:pPr>
+            <a:endParaRPr lang="en-US" dirty="0"/>
+          </a:p>
+        </p:txBody>
+      </p:sp>
+      <p:pic>
+        <p:nvPicPr>
+          <p:cNvPr id="3" name="Picture 2"/>
+          <p:cNvPicPr>
+            <a:picLocks noChangeAspect="1"/>
+          </p:cNvPicPr>
+          <p:nvPr/>
+        </p:nvPicPr>
+        <p:blipFill>
+          <a:blip r:embed="rId2"/>
+          <a:stretch>
+            <a:fillRect/>
+          </a:stretch>
+        </p:blipFill>
+        <p:spPr>
+          <a:xfrm>
+            <a:off x="7538031" y="2516279"/>
+            <a:ext cx="4704089" cy="4144821"/>
+          </a:xfrm>
+          <a:prstGeom prst="rect">
+            <a:avLst/>
+          </a:prstGeom>
+        </p:spPr>
+      </p:pic>
+      <p:pic>
+        <p:nvPicPr>
+          <p:cNvPr id="5" name="Picture 4"/>
+          <p:cNvPicPr>
+            <a:picLocks noChangeAspect="1"/>
+          </p:cNvPicPr>
+          <p:nvPr/>
+        </p:nvPicPr>
+        <p:blipFill>
+          <a:blip r:embed="rId3"/>
+          <a:stretch>
+            <a:fillRect/>
+          </a:stretch>
+        </p:blipFill>
+        <p:spPr>
+          <a:xfrm>
+            <a:off x="559101" y="3473276"/>
+            <a:ext cx="6481376" cy="365616"/>
+          </a:xfrm>
+          <a:prstGeom prst="rect">
+            <a:avLst/>
+          </a:prstGeom>
+          <a:ln w="3175">
+            <a:solidFill>
+              <a:schemeClr val="tx1"/>
+            </a:solidFill>
+          </a:ln>
+        </p:spPr>
+      </p:pic>
     </p:spTree>
     <p:extLst>
       <p:ext uri="{BB962C8B-B14F-4D97-AF65-F5344CB8AC3E}">
-        <p14:creationId xmlns:p14="http://schemas.microsoft.com/office/powerpoint/2010/main" val="3268357511"/>
+        <p14:creationId xmlns:p14="http://schemas.microsoft.com/office/powerpoint/2010/main" val="4029086622"/>
       </p:ext>
     </p:extLst>
   </p:cSld>
   <p:clrMapOvr>
     <a:masterClrMapping/>
   </p:clrMapOvr>
+  <p:timing>
+    <p:tnLst>
+      <p:par>
+        <p:cTn id="1" dur="indefinite" restart="never" nodeType="tmRoot"/>
+      </p:par>
+    </p:tnLst>
+  </p:timing>
 </p:sld>
 </file>
 
@@ -14641,10 +14764,230 @@
       </p:grpSpPr>
       <p:sp>
         <p:nvSpPr>
+          <p:cNvPr id="2" name="Title 1">
+            <a:extLst>
+              <a:ext uri="{FF2B5EF4-FFF2-40B4-BE49-F238E27FC236}">
+                <a16:creationId xmlns:a16="http://schemas.microsoft.com/office/drawing/2014/main" xmlns="" id="{FCB102D8-1D22-4940-AF19-07CF3A0DC5F4}"/>
+              </a:ext>
+            </a:extLst>
+          </p:cNvPr>
+          <p:cNvSpPr>
+            <a:spLocks noGrp="1"/>
+          </p:cNvSpPr>
+          <p:nvPr>
+            <p:ph type="title"/>
+          </p:nvPr>
+        </p:nvSpPr>
+        <p:spPr>
+          <a:xfrm>
+            <a:off x="550862" y="549275"/>
+            <a:ext cx="11091600" cy="1332000"/>
+          </a:xfrm>
+        </p:spPr>
+        <p:txBody>
+          <a:bodyPr/>
+          <a:lstStyle/>
+          <a:p>
+            <a:r>
+              <a:rPr lang="en-US" dirty="0"/>
+              <a:t>Next Steps</a:t>
+            </a:r>
+          </a:p>
+        </p:txBody>
+      </p:sp>
+      <p:sp>
+        <p:nvSpPr>
+          <p:cNvPr id="14" name="Date Placeholder 13">
+            <a:extLst>
+              <a:ext uri="{FF2B5EF4-FFF2-40B4-BE49-F238E27FC236}">
+                <a16:creationId xmlns:a16="http://schemas.microsoft.com/office/drawing/2014/main" xmlns="" id="{DC738669-5750-45EA-9715-A0041D4C569B}"/>
+              </a:ext>
+            </a:extLst>
+          </p:cNvPr>
+          <p:cNvSpPr>
+            <a:spLocks noGrp="1"/>
+          </p:cNvSpPr>
+          <p:nvPr>
+            <p:ph type="dt" sz="half" idx="10"/>
+          </p:nvPr>
+        </p:nvSpPr>
+        <p:spPr>
+          <a:xfrm>
+            <a:off x="550863" y="6507212"/>
+            <a:ext cx="2628900" cy="153888"/>
+          </a:xfrm>
+        </p:spPr>
+        <p:txBody>
+          <a:bodyPr/>
+          <a:lstStyle/>
+          <a:p>
+            <a:r>
+              <a:rPr lang="en-US"/>
+              <a:t>Tuesday, February 2, 20XX</a:t>
+            </a:r>
+          </a:p>
+        </p:txBody>
+      </p:sp>
+      <p:sp>
+        <p:nvSpPr>
+          <p:cNvPr id="15" name="Footer Placeholder 14">
+            <a:extLst>
+              <a:ext uri="{FF2B5EF4-FFF2-40B4-BE49-F238E27FC236}">
+                <a16:creationId xmlns:a16="http://schemas.microsoft.com/office/drawing/2014/main" xmlns="" id="{CD05A243-8080-4F6D-8538-65CDDF891BA6}"/>
+              </a:ext>
+            </a:extLst>
+          </p:cNvPr>
+          <p:cNvSpPr>
+            <a:spLocks noGrp="1"/>
+          </p:cNvSpPr>
+          <p:nvPr>
+            <p:ph type="ftr" sz="quarter" idx="11"/>
+          </p:nvPr>
+        </p:nvSpPr>
+        <p:spPr>
+          <a:xfrm>
+            <a:off x="3359150" y="6507212"/>
+            <a:ext cx="6379210" cy="153888"/>
+          </a:xfrm>
+        </p:spPr>
+        <p:txBody>
+          <a:bodyPr/>
+          <a:lstStyle/>
+          <a:p>
+            <a:r>
+              <a:rPr lang="en-US"/>
+              <a:t>Sample Footer Text</a:t>
+            </a:r>
+          </a:p>
+        </p:txBody>
+      </p:sp>
+      <p:sp>
+        <p:nvSpPr>
+          <p:cNvPr id="16" name="Slide Number Placeholder 15">
+            <a:extLst>
+              <a:ext uri="{FF2B5EF4-FFF2-40B4-BE49-F238E27FC236}">
+                <a16:creationId xmlns:a16="http://schemas.microsoft.com/office/drawing/2014/main" xmlns="" id="{3F8A62C8-5437-4C47-AC0F-0605F84CBA57}"/>
+              </a:ext>
+            </a:extLst>
+          </p:cNvPr>
+          <p:cNvSpPr>
+            <a:spLocks noGrp="1"/>
+          </p:cNvSpPr>
+          <p:nvPr>
+            <p:ph type="sldNum" sz="quarter" idx="12"/>
+          </p:nvPr>
+        </p:nvSpPr>
+        <p:spPr>
+          <a:xfrm>
+            <a:off x="9948863" y="6507212"/>
+            <a:ext cx="1692274" cy="153888"/>
+          </a:xfrm>
+        </p:spPr>
+        <p:txBody>
+          <a:bodyPr/>
+          <a:lstStyle/>
+          <a:p>
+            <a:fld id="{DBA1B0FB-D917-4C8C-928F-313BD683BF39}" type="slidenum">
+              <a:rPr lang="en-US" smtClean="0"/>
+              <a:pPr/>
+              <a:t>8</a:t>
+            </a:fld>
+            <a:endParaRPr lang="en-US"/>
+          </a:p>
+        </p:txBody>
+      </p:sp>
+      <p:sp>
+        <p:nvSpPr>
+          <p:cNvPr id="4" name="Content Placeholder 3">
+            <a:extLst>
+              <a:ext uri="{FF2B5EF4-FFF2-40B4-BE49-F238E27FC236}">
+                <a16:creationId xmlns:a16="http://schemas.microsoft.com/office/drawing/2014/main" xmlns="" id="{51931B04-A0C8-CEE1-4CFC-B6B89C11027A}"/>
+              </a:ext>
+            </a:extLst>
+          </p:cNvPr>
+          <p:cNvSpPr>
+            <a:spLocks noGrp="1"/>
+          </p:cNvSpPr>
+          <p:nvPr>
+            <p:ph idx="1"/>
+          </p:nvPr>
+        </p:nvSpPr>
+        <p:spPr/>
+        <p:txBody>
+          <a:bodyPr/>
+          <a:lstStyle/>
+          <a:p>
+            <a:r>
+              <a:rPr lang="en-US" dirty="0"/>
+              <a:t>Implement features</a:t>
+            </a:r>
+          </a:p>
+          <a:p>
+            <a:pPr lvl="1"/>
+            <a:r>
+              <a:rPr lang="en-US" dirty="0"/>
+              <a:t>Not more than one survey response per address</a:t>
+            </a:r>
+          </a:p>
+          <a:p>
+            <a:pPr lvl="1"/>
+            <a:r>
+              <a:rPr lang="en-US" dirty="0"/>
+              <a:t>A way to authenticate that the responder is a human</a:t>
+            </a:r>
+          </a:p>
+          <a:p>
+            <a:pPr lvl="1"/>
+            <a:r>
+              <a:rPr lang="en-US" dirty="0"/>
+              <a:t>Publish results only after the survey timeline expired</a:t>
+            </a:r>
+          </a:p>
+        </p:txBody>
+      </p:sp>
+    </p:spTree>
+    <p:extLst>
+      <p:ext uri="{BB962C8B-B14F-4D97-AF65-F5344CB8AC3E}">
+        <p14:creationId xmlns:p14="http://schemas.microsoft.com/office/powerpoint/2010/main" val="3268357511"/>
+      </p:ext>
+    </p:extLst>
+  </p:cSld>
+  <p:clrMapOvr>
+    <a:masterClrMapping/>
+  </p:clrMapOvr>
+  <p:timing>
+    <p:tnLst>
+      <p:par>
+        <p:cTn id="1" dur="indefinite" restart="never" nodeType="tmRoot"/>
+      </p:par>
+    </p:tnLst>
+  </p:timing>
+</p:sld>
+</file>
+
+<file path=ppt/slides/slide9.xml><?xml version="1.0" encoding="utf-8"?>
+<p:sld xmlns:a="http://schemas.openxmlformats.org/drawingml/2006/main" xmlns:r="http://schemas.openxmlformats.org/officeDocument/2006/relationships" xmlns:p="http://schemas.openxmlformats.org/presentationml/2006/main">
+  <p:cSld>
+    <p:spTree>
+      <p:nvGrpSpPr>
+        <p:cNvPr id="1" name=""/>
+        <p:cNvGrpSpPr/>
+        <p:nvPr/>
+      </p:nvGrpSpPr>
+      <p:grpSpPr>
+        <a:xfrm>
+          <a:off x="0" y="0"/>
+          <a:ext cx="0" cy="0"/>
+          <a:chOff x="0" y="0"/>
+          <a:chExt cx="0" cy="0"/>
+        </a:xfrm>
+      </p:grpSpPr>
+      <p:sp>
+        <p:nvSpPr>
           <p:cNvPr id="22" name="Title 21">
             <a:extLst>
               <a:ext uri="{FF2B5EF4-FFF2-40B4-BE49-F238E27FC236}">
-                <a16:creationId xmlns:a16="http://schemas.microsoft.com/office/drawing/2014/main" id="{F8FAEED9-1ECD-45F9-87A0-9394BAEABB79}"/>
+                <a16:creationId xmlns:a16="http://schemas.microsoft.com/office/drawing/2014/main" xmlns="" id="{F8FAEED9-1ECD-45F9-87A0-9394BAEABB79}"/>
               </a:ext>
             </a:extLst>
           </p:cNvPr>
@@ -14677,7 +15020,7 @@
           <p:cNvPr id="23" name="Subtitle 22">
             <a:extLst>
               <a:ext uri="{FF2B5EF4-FFF2-40B4-BE49-F238E27FC236}">
-                <a16:creationId xmlns:a16="http://schemas.microsoft.com/office/drawing/2014/main" id="{8E5E4638-9BCB-4C2E-914F-CC868E2020D5}"/>
+                <a16:creationId xmlns:a16="http://schemas.microsoft.com/office/drawing/2014/main" xmlns="" id="{8E5E4638-9BCB-4C2E-914F-CC868E2020D5}"/>
               </a:ext>
             </a:extLst>
           </p:cNvPr>
@@ -14732,7 +15075,7 @@
           <p:cNvPr id="27" name="Picture Placeholder 26" descr="Data Points Digital background">
             <a:extLst>
               <a:ext uri="{FF2B5EF4-FFF2-40B4-BE49-F238E27FC236}">
-                <a16:creationId xmlns:a16="http://schemas.microsoft.com/office/drawing/2014/main" id="{9E660784-34E2-4CDA-926A-DDD6AAF35046}"/>
+                <a16:creationId xmlns:a16="http://schemas.microsoft.com/office/drawing/2014/main" xmlns="" id="{9E660784-34E2-4CDA-926A-DDD6AAF35046}"/>
               </a:ext>
             </a:extLst>
           </p:cNvPr>
@@ -14766,7 +15109,7 @@
           <p:cNvPr id="33" name="Picture Placeholder 32" descr="Data Points Digital background">
             <a:extLst>
               <a:ext uri="{FF2B5EF4-FFF2-40B4-BE49-F238E27FC236}">
-                <a16:creationId xmlns:a16="http://schemas.microsoft.com/office/drawing/2014/main" id="{48106962-23C6-4DFE-BB3A-E5FFF03F38CE}"/>
+                <a16:creationId xmlns:a16="http://schemas.microsoft.com/office/drawing/2014/main" xmlns="" id="{48106962-23C6-4DFE-BB3A-E5FFF03F38CE}"/>
               </a:ext>
             </a:extLst>
           </p:cNvPr>
@@ -14800,7 +15143,7 @@
           <p:cNvPr id="4" name="Date Placeholder 3">
             <a:extLst>
               <a:ext uri="{FF2B5EF4-FFF2-40B4-BE49-F238E27FC236}">
-                <a16:creationId xmlns:a16="http://schemas.microsoft.com/office/drawing/2014/main" id="{7823E305-6365-4345-8BD1-4A31C61D96CB}"/>
+                <a16:creationId xmlns:a16="http://schemas.microsoft.com/office/drawing/2014/main" xmlns="" id="{7823E305-6365-4345-8BD1-4A31C61D96CB}"/>
               </a:ext>
             </a:extLst>
           </p:cNvPr>
@@ -14833,7 +15176,7 @@
           <p:cNvPr id="5" name="Footer Placeholder 4">
             <a:extLst>
               <a:ext uri="{FF2B5EF4-FFF2-40B4-BE49-F238E27FC236}">
-                <a16:creationId xmlns:a16="http://schemas.microsoft.com/office/drawing/2014/main" id="{0B37A3FF-ED32-4C4A-A21F-848A3BF6F896}"/>
+                <a16:creationId xmlns:a16="http://schemas.microsoft.com/office/drawing/2014/main" xmlns="" id="{0B37A3FF-ED32-4C4A-A21F-848A3BF6F896}"/>
               </a:ext>
             </a:extLst>
           </p:cNvPr>
@@ -14866,7 +15209,7 @@
           <p:cNvPr id="6" name="Slide Number Placeholder 5">
             <a:extLst>
               <a:ext uri="{FF2B5EF4-FFF2-40B4-BE49-F238E27FC236}">
-                <a16:creationId xmlns:a16="http://schemas.microsoft.com/office/drawing/2014/main" id="{36E60F23-FB58-4EF8-82FD-E86CED25FDD4}"/>
+                <a16:creationId xmlns:a16="http://schemas.microsoft.com/office/drawing/2014/main" xmlns="" id="{36E60F23-FB58-4EF8-82FD-E86CED25FDD4}"/>
               </a:ext>
             </a:extLst>
           </p:cNvPr>
@@ -14890,7 +15233,7 @@
             <a:fld id="{DBA1B0FB-D917-4C8C-928F-313BD683BF39}" type="slidenum">
               <a:rPr lang="en-US" smtClean="0"/>
               <a:pPr/>
-              <a:t>8</a:t>
+              <a:t>9</a:t>
             </a:fld>
             <a:endParaRPr lang="en-US"/>
           </a:p>
@@ -14906,6 +15249,13 @@
   <p:clrMapOvr>
     <a:masterClrMapping/>
   </p:clrMapOvr>
+  <p:timing>
+    <p:tnLst>
+      <p:par>
+        <p:cTn id="1" dur="indefinite" restart="never" nodeType="tmRoot"/>
+      </p:par>
+    </p:tnLst>
+  </p:timing>
 </p:sld>
 </file>
 
@@ -15701,6 +16051,15 @@
 </file>
 
 <file path=customXml/item1.xml><?xml version="1.0" encoding="utf-8"?>
+<?mso-contentType ?>
+<FormTemplates xmlns="http://schemas.microsoft.com/sharepoint/v3/contenttype/forms">
+  <Display>DocumentLibraryForm</Display>
+  <Edit>DocumentLibraryForm</Edit>
+  <New>DocumentLibraryForm</New>
+</FormTemplates>
+</file>
+
+<file path=customXml/item2.xml><?xml version="1.0" encoding="utf-8"?>
 <p:properties xmlns:p="http://schemas.microsoft.com/office/2006/metadata/properties" xmlns:xsi="http://www.w3.org/2001/XMLSchema-instance" xmlns:pc="http://schemas.microsoft.com/office/infopath/2007/PartnerControls">
   <documentManagement>
     <_ip_UnifiedCompliancePolicyUIAction xmlns="http://schemas.microsoft.com/sharepoint/v3" xsi:nil="true"/>
@@ -15717,15 +16076,6 @@
     <MediaServiceKeyPoints xmlns="71af3243-3dd4-4a8d-8c0d-dd76da1f02a5" xsi:nil="true"/>
   </documentManagement>
 </p:properties>
-</file>
-
-<file path=customXml/item2.xml><?xml version="1.0" encoding="utf-8"?>
-<?mso-contentType ?>
-<FormTemplates xmlns="http://schemas.microsoft.com/sharepoint/v3/contenttype/forms">
-  <Display>DocumentLibraryForm</Display>
-  <Edit>DocumentLibraryForm</Edit>
-  <New>DocumentLibraryForm</New>
-</FormTemplates>
 </file>
 
 <file path=customXml/item3.xml><?xml version="1.0" encoding="utf-8"?>
@@ -16005,21 +16355,28 @@
 </file>
 
 <file path=customXml/itemProps1.xml><?xml version="1.0" encoding="utf-8"?>
-<ds:datastoreItem xmlns:ds="http://schemas.openxmlformats.org/officeDocument/2006/customXml" ds:itemID="{50811A92-D464-4AC4-A396-BA73B10CEEAC}">
+<ds:datastoreItem xmlns:ds="http://schemas.openxmlformats.org/officeDocument/2006/customXml" ds:itemID="{904751AB-E840-446F-8D49-E697067EC887}">
   <ds:schemaRefs>
-    <ds:schemaRef ds:uri="http://schemas.microsoft.com/office/2006/metadata/properties"/>
-    <ds:schemaRef ds:uri="http://schemas.microsoft.com/office/infopath/2007/PartnerControls"/>
-    <ds:schemaRef ds:uri="http://schemas.microsoft.com/sharepoint/v3"/>
-    <ds:schemaRef ds:uri="71af3243-3dd4-4a8d-8c0d-dd76da1f02a5"/>
-    <ds:schemaRef ds:uri="230e9df3-be65-4c73-a93b-d1236ebd677e"/>
+    <ds:schemaRef ds:uri="http://schemas.microsoft.com/sharepoint/v3/contenttype/forms"/>
   </ds:schemaRefs>
 </ds:datastoreItem>
 </file>
 
 <file path=customXml/itemProps2.xml><?xml version="1.0" encoding="utf-8"?>
-<ds:datastoreItem xmlns:ds="http://schemas.openxmlformats.org/officeDocument/2006/customXml" ds:itemID="{904751AB-E840-446F-8D49-E697067EC887}">
+<ds:datastoreItem xmlns:ds="http://schemas.openxmlformats.org/officeDocument/2006/customXml" ds:itemID="{50811A92-D464-4AC4-A396-BA73B10CEEAC}">
   <ds:schemaRefs>
-    <ds:schemaRef ds:uri="http://schemas.microsoft.com/sharepoint/v3/contenttype/forms"/>
+    <ds:schemaRef ds:uri="http://schemas.microsoft.com/office/2006/documentManagement/types"/>
+    <ds:schemaRef ds:uri="http://purl.org/dc/dcmitype/"/>
+    <ds:schemaRef ds:uri="230e9df3-be65-4c73-a93b-d1236ebd677e"/>
+    <ds:schemaRef ds:uri="http://purl.org/dc/terms/"/>
+    <ds:schemaRef ds:uri="http://purl.org/dc/elements/1.1/"/>
+    <ds:schemaRef ds:uri="http://www.w3.org/XML/1998/namespace"/>
+    <ds:schemaRef ds:uri="http://schemas.openxmlformats.org/package/2006/metadata/core-properties"/>
+    <ds:schemaRef ds:uri="http://schemas.microsoft.com/sharepoint/v3"/>
+    <ds:schemaRef ds:uri="http://schemas.microsoft.com/office/infopath/2007/PartnerControls"/>
+    <ds:schemaRef ds:uri="16c05727-aa75-4e4a-9b5f-8a80a1165891"/>
+    <ds:schemaRef ds:uri="71af3243-3dd4-4a8d-8c0d-dd76da1f02a5"/>
+    <ds:schemaRef ds:uri="http://schemas.microsoft.com/office/2006/metadata/properties"/>
   </ds:schemaRefs>
 </ds:datastoreItem>
 </file>

</xml_diff>